<commit_message>
add data for demonstrations and update presentation and other little updates. That's end B)
</commit_message>
<xml_diff>
--- a/docs/Дадыков_Артемий_Презентация.pptx
+++ b/docs/Дадыков_Артемий_Презентация.pptx
@@ -298,7 +298,7 @@
           <a:p>
             <a:fld id="{73261BF4-8B2C-784B-9959-B59A059012C3}" type="datetimeFigureOut">
               <a:rPr lang="en-RU" smtClean="0"/>
-              <a:t>04/22/2024</a:t>
+              <a:t>04/23/2024</a:t>
             </a:fld>
             <a:endParaRPr lang="en-RU"/>
           </a:p>
@@ -13702,7 +13702,7 @@
           <a:p>
             <a:fld id="{53063DFB-8595-A44B-9F09-A50FA310E559}" type="datetimeFigureOut">
               <a:rPr lang="en-RU" smtClean="0"/>
-              <a:t>04/22/2024</a:t>
+              <a:t>04/23/2024</a:t>
             </a:fld>
             <a:endParaRPr lang="en-RU"/>
           </a:p>
@@ -14902,8 +14902,8 @@
         </p:nvSpPr>
         <p:spPr>
           <a:xfrm>
-            <a:off x="585895" y="2069029"/>
-            <a:ext cx="9697725" cy="3867814"/>
+            <a:off x="585895" y="2069028"/>
+            <a:ext cx="11161605" cy="4407972"/>
           </a:xfrm>
         </p:spPr>
         <p:txBody>
@@ -14917,7 +14917,7 @@
             </a:pPr>
             <a:r>
               <a:rPr lang="ru-RU" sz="1800" dirty="0"/>
-              <a:t>Развертывание программного обеспечения на выделенном сервере</a:t>
+              <a:t>Разработка алгоритма распознавания рукописного текста на различных языках</a:t>
             </a:r>
             <a:r>
               <a:rPr lang="en-US" sz="1800" dirty="0"/>
@@ -14931,7 +14931,7 @@
             </a:pPr>
             <a:r>
               <a:rPr lang="ru-RU" sz="1800" dirty="0"/>
-              <a:t>Создание мобильного приложения</a:t>
+              <a:t>Развертывание программного обеспечения на выделенном сервере</a:t>
             </a:r>
             <a:r>
               <a:rPr lang="en-US" sz="1800" dirty="0"/>
@@ -14945,12 +14945,13 @@
             </a:pPr>
             <a:r>
               <a:rPr lang="ru-RU" sz="1800" dirty="0"/>
-              <a:t>Добавление англоязычной версии приложения</a:t>
+              <a:t>Создание мобильной версии приложения</a:t>
             </a:r>
             <a:r>
               <a:rPr lang="en-US" sz="1800" dirty="0"/>
               <a:t>;</a:t>
             </a:r>
+            <a:endParaRPr lang="ru-RU" sz="1800" dirty="0"/>
           </a:p>
           <a:p>
             <a:pPr marL="342900" indent="-342900" algn="just">
@@ -14958,13 +14959,12 @@
             </a:pPr>
             <a:r>
               <a:rPr lang="ru-RU" sz="1800" dirty="0"/>
-              <a:t>Возможность добавления комментариев к урокам</a:t>
+              <a:t>Добавление англоязычной версии приложения</a:t>
             </a:r>
             <a:r>
               <a:rPr lang="en-US" sz="1800" dirty="0"/>
               <a:t>;</a:t>
             </a:r>
-            <a:endParaRPr lang="ru-RU" sz="1800" dirty="0"/>
           </a:p>
           <a:p>
             <a:pPr marL="342900" indent="-342900" algn="just">
@@ -14972,12 +14972,13 @@
             </a:pPr>
             <a:r>
               <a:rPr lang="ru-RU" sz="1800" dirty="0"/>
-              <a:t>Возможность создания уведомлений в учебных классах</a:t>
+              <a:t>Возможность добавления комментариев к урокам</a:t>
             </a:r>
             <a:r>
               <a:rPr lang="en-US" sz="1800" dirty="0"/>
               <a:t>;</a:t>
             </a:r>
+            <a:endParaRPr lang="ru-RU" sz="1800" dirty="0"/>
           </a:p>
           <a:p>
             <a:pPr marL="342900" indent="-342900" algn="just">
@@ -14985,13 +14986,12 @@
             </a:pPr>
             <a:r>
               <a:rPr lang="ru-RU" sz="1800" dirty="0"/>
-              <a:t>Улучшение кодовой базы</a:t>
+              <a:t>Возможность создания уведомлений в учебных классах</a:t>
             </a:r>
             <a:r>
               <a:rPr lang="en-US" sz="1800" dirty="0"/>
               <a:t>;</a:t>
             </a:r>
-            <a:endParaRPr lang="ru-RU" sz="1800" dirty="0"/>
           </a:p>
           <a:p>
             <a:pPr marL="342900" indent="-342900" algn="just">
@@ -14999,7 +14999,69 @@
             </a:pPr>
             <a:r>
               <a:rPr lang="ru-RU" sz="1800" dirty="0"/>
-              <a:t>Улучшение архитектурных решений</a:t>
+              <a:t>Двухфакторная аутентификация (проверка почты)</a:t>
+            </a:r>
+            <a:r>
+              <a:rPr lang="en-US" sz="1800" dirty="0"/>
+              <a:t>;</a:t>
+            </a:r>
+            <a:endParaRPr lang="ru-RU" sz="1800" dirty="0"/>
+          </a:p>
+          <a:p>
+            <a:pPr marL="342900" indent="-342900" algn="just">
+              <a:buAutoNum type="arabicPeriod"/>
+            </a:pPr>
+            <a:r>
+              <a:rPr lang="ru-RU" sz="1800" dirty="0"/>
+              <a:t>Улучшение кодовой базы (оптимизация </a:t>
+            </a:r>
+            <a:r>
+              <a:rPr lang="en-US" sz="1800" dirty="0"/>
+              <a:t>SQL</a:t>
+            </a:r>
+            <a:r>
+              <a:rPr lang="ru-RU" sz="1800" dirty="0"/>
+              <a:t> запросов, рефакторинг кода)</a:t>
+            </a:r>
+            <a:r>
+              <a:rPr lang="en-US" sz="1800" dirty="0"/>
+              <a:t>;</a:t>
+            </a:r>
+            <a:endParaRPr lang="ru-RU" sz="1800" dirty="0"/>
+          </a:p>
+          <a:p>
+            <a:pPr marL="342900" indent="-342900" algn="just">
+              <a:buAutoNum type="arabicPeriod"/>
+            </a:pPr>
+            <a:r>
+              <a:rPr lang="ru-RU" sz="1800" dirty="0"/>
+              <a:t>Улучшение архитектурных решений (например, работать через роли)</a:t>
+            </a:r>
+            <a:r>
+              <a:rPr lang="en-US" sz="1800" dirty="0"/>
+              <a:t>;</a:t>
+            </a:r>
+          </a:p>
+          <a:p>
+            <a:pPr marL="342900" indent="-342900" algn="just">
+              <a:buAutoNum type="arabicPeriod"/>
+            </a:pPr>
+            <a:r>
+              <a:rPr lang="ru-RU" sz="1800" dirty="0"/>
+              <a:t>Добавление новых ролей в системе: администратор, поддержка</a:t>
+            </a:r>
+            <a:r>
+              <a:rPr lang="en-US" sz="1800" dirty="0"/>
+              <a:t>;</a:t>
+            </a:r>
+          </a:p>
+          <a:p>
+            <a:pPr marL="342900" indent="-342900" algn="just">
+              <a:buAutoNum type="arabicPeriod"/>
+            </a:pPr>
+            <a:r>
+              <a:rPr lang="ru-RU" sz="1800" dirty="0"/>
+              <a:t>Реализовать тестирование приложения</a:t>
             </a:r>
             <a:r>
               <a:rPr lang="en-US" sz="1800" dirty="0"/>
@@ -18041,14 +18103,14 @@
           <p:nvPr>
             <p:extLst>
               <p:ext uri="{D42A27DB-BD31-4B8C-83A1-F6EECF244321}">
-                <p14:modId xmlns:p14="http://schemas.microsoft.com/office/powerpoint/2010/main" val="2041037770"/>
+                <p14:modId xmlns:p14="http://schemas.microsoft.com/office/powerpoint/2010/main" val="1511195363"/>
               </p:ext>
             </p:extLst>
           </p:nvPr>
         </p:nvGraphicFramePr>
         <p:xfrm>
           <a:off x="585898" y="1926480"/>
-          <a:ext cx="11020204" cy="2397277"/>
+          <a:ext cx="11020204" cy="2874314"/>
         </p:xfrm>
         <a:graphic>
           <a:graphicData uri="http://schemas.openxmlformats.org/drawingml/2006/table">
@@ -18538,6 +18600,156 @@
                   </a:ext>
                 </a:extLst>
               </a:tr>
+              <a:tr h="477037">
+                <a:tc>
+                  <a:txBody>
+                    <a:bodyPr/>
+                    <a:lstStyle/>
+                    <a:p>
+                      <a:r>
+                        <a:rPr lang="ru-RU" sz="1800" dirty="0"/>
+                        <a:t>Сканирование текста с фотографии</a:t>
+                      </a:r>
+                    </a:p>
+                  </a:txBody>
+                  <a:tcPr>
+                    <a:solidFill>
+                      <a:schemeClr val="accent2">
+                        <a:lumMod val="60000"/>
+                        <a:lumOff val="40000"/>
+                      </a:schemeClr>
+                    </a:solidFill>
+                  </a:tcPr>
+                </a:tc>
+                <a:tc>
+                  <a:txBody>
+                    <a:bodyPr/>
+                    <a:lstStyle/>
+                    <a:p>
+                      <a:pPr marL="0" marR="0" lvl="0" indent="0" algn="l" defTabSz="914400" rtl="0" eaLnBrk="1" fontAlgn="auto" latinLnBrk="0" hangingPunct="1">
+                        <a:lnSpc>
+                          <a:spcPct val="100000"/>
+                        </a:lnSpc>
+                        <a:spcBef>
+                          <a:spcPts val="0"/>
+                        </a:spcBef>
+                        <a:spcAft>
+                          <a:spcPts val="0"/>
+                        </a:spcAft>
+                        <a:buClrTx/>
+                        <a:buSzTx/>
+                        <a:buFontTx/>
+                        <a:buNone/>
+                        <a:tabLst/>
+                        <a:defRPr/>
+                      </a:pPr>
+                      <a:r>
+                        <a:rPr lang="ru-RU" sz="1800" b="1" dirty="0"/>
+                        <a:t>-</a:t>
+                      </a:r>
+                    </a:p>
+                  </a:txBody>
+                  <a:tcPr>
+                    <a:solidFill>
+                      <a:schemeClr val="accent2">
+                        <a:lumMod val="60000"/>
+                        <a:lumOff val="40000"/>
+                      </a:schemeClr>
+                    </a:solidFill>
+                  </a:tcPr>
+                </a:tc>
+                <a:tc>
+                  <a:txBody>
+                    <a:bodyPr/>
+                    <a:lstStyle/>
+                    <a:p>
+                      <a:r>
+                        <a:rPr lang="ru-RU" sz="1800" b="1" dirty="0"/>
+                        <a:t>+</a:t>
+                      </a:r>
+                    </a:p>
+                  </a:txBody>
+                  <a:tcPr>
+                    <a:solidFill>
+                      <a:schemeClr val="accent2">
+                        <a:lumMod val="60000"/>
+                        <a:lumOff val="40000"/>
+                      </a:schemeClr>
+                    </a:solidFill>
+                  </a:tcPr>
+                </a:tc>
+                <a:tc>
+                  <a:txBody>
+                    <a:bodyPr/>
+                    <a:lstStyle/>
+                    <a:p>
+                      <a:r>
+                        <a:rPr lang="ru-RU" sz="1800" b="1" dirty="0"/>
+                        <a:t>-</a:t>
+                      </a:r>
+                    </a:p>
+                  </a:txBody>
+                  <a:tcPr>
+                    <a:solidFill>
+                      <a:schemeClr val="accent2">
+                        <a:lumMod val="60000"/>
+                        <a:lumOff val="40000"/>
+                      </a:schemeClr>
+                    </a:solidFill>
+                  </a:tcPr>
+                </a:tc>
+                <a:tc>
+                  <a:txBody>
+                    <a:bodyPr/>
+                    <a:lstStyle/>
+                    <a:p>
+                      <a:pPr marL="0" marR="0" lvl="0" indent="0" algn="l" defTabSz="914400" rtl="0" eaLnBrk="1" fontAlgn="auto" latinLnBrk="0" hangingPunct="1">
+                        <a:lnSpc>
+                          <a:spcPct val="100000"/>
+                        </a:lnSpc>
+                        <a:spcBef>
+                          <a:spcPts val="0"/>
+                        </a:spcBef>
+                        <a:spcAft>
+                          <a:spcPts val="0"/>
+                        </a:spcAft>
+                        <a:buClrTx/>
+                        <a:buSzTx/>
+                        <a:buFontTx/>
+                        <a:buNone/>
+                        <a:tabLst/>
+                        <a:defRPr/>
+                      </a:pPr>
+                      <a:r>
+                        <a:rPr lang="en-US" sz="1800" b="1" dirty="0"/>
+                        <a:t>[</a:t>
+                      </a:r>
+                      <a:r>
+                        <a:rPr lang="ru-RU" sz="1800" b="1" dirty="0"/>
+                        <a:t>+</a:t>
+                      </a:r>
+                      <a:r>
+                        <a:rPr lang="en-US" sz="1800" b="1" dirty="0"/>
+                        <a:t>]</a:t>
+                      </a:r>
+                      <a:endParaRPr lang="ru-RU" sz="1800" b="1" dirty="0"/>
+                    </a:p>
+                  </a:txBody>
+                  <a:tcPr>
+                    <a:solidFill>
+                      <a:schemeClr val="accent2">
+                        <a:lumMod val="60000"/>
+                        <a:lumOff val="40000"/>
+                      </a:schemeClr>
+                    </a:solidFill>
+                  </a:tcPr>
+                </a:tc>
+                <a:extLst>
+                  <a:ext uri="{0D108BD9-81ED-4DB2-BD59-A6C34878D82A}">
+                    <a16:rowId xmlns:a16="http://schemas.microsoft.com/office/drawing/2014/main" val="3218863689"/>
+                  </a:ext>
+                </a:extLst>
+              </a:tr>
             </a:tbl>
           </a:graphicData>
         </a:graphic>
@@ -18721,14 +18933,14 @@
           <p:nvPr>
             <p:extLst>
               <p:ext uri="{D42A27DB-BD31-4B8C-83A1-F6EECF244321}">
-                <p14:modId xmlns:p14="http://schemas.microsoft.com/office/powerpoint/2010/main" val="2934136366"/>
+                <p14:modId xmlns:p14="http://schemas.microsoft.com/office/powerpoint/2010/main" val="4094321036"/>
               </p:ext>
             </p:extLst>
           </p:nvPr>
         </p:nvGraphicFramePr>
         <p:xfrm>
           <a:off x="562464" y="2157323"/>
-          <a:ext cx="11067072" cy="4205783"/>
+          <a:ext cx="11067072" cy="4325418"/>
         </p:xfrm>
         <a:graphic>
           <a:graphicData uri="http://schemas.openxmlformats.org/drawingml/2006/table">
@@ -19046,16 +19258,18 @@
                         <a:rPr lang="ru-RU" sz="1400" dirty="0"/>
                         <a:t>Создание</a:t>
                       </a:r>
-                    </a:p>
-                    <a:p>
-                      <a:pPr algn="ctr"/>
+                      <a:r>
+                        <a:rPr lang="en-US" sz="1400" dirty="0"/>
+                        <a:t>/</a:t>
+                      </a:r>
                       <a:r>
                         <a:rPr lang="ru-RU" sz="1400" dirty="0"/>
                         <a:t>Изменение</a:t>
                       </a:r>
-                    </a:p>
-                    <a:p>
-                      <a:pPr algn="ctr"/>
+                      <a:r>
+                        <a:rPr lang="en-US" sz="1400" dirty="0"/>
+                        <a:t>/</a:t>
+                      </a:r>
                       <a:r>
                         <a:rPr lang="ru-RU" sz="1400" dirty="0"/>
                         <a:t>Удаление</a:t>
@@ -19129,16 +19343,18 @@
                         <a:rPr lang="ru-RU" sz="1400" dirty="0"/>
                         <a:t>Создание</a:t>
                       </a:r>
-                    </a:p>
-                    <a:p>
-                      <a:pPr algn="ctr"/>
+                      <a:r>
+                        <a:rPr lang="en-US" sz="1400" dirty="0"/>
+                        <a:t>/</a:t>
+                      </a:r>
                       <a:r>
                         <a:rPr lang="ru-RU" sz="1400" dirty="0"/>
                         <a:t>Изменение</a:t>
                       </a:r>
-                    </a:p>
-                    <a:p>
-                      <a:pPr algn="ctr"/>
+                      <a:r>
+                        <a:rPr lang="en-US" sz="1400" dirty="0"/>
+                        <a:t>/</a:t>
+                      </a:r>
                       <a:r>
                         <a:rPr lang="ru-RU" sz="1400" dirty="0"/>
                         <a:t>Удаление</a:t>
@@ -19192,16 +19408,18 @@
                         <a:rPr lang="ru-RU" sz="1400" dirty="0"/>
                         <a:t>Создание</a:t>
                       </a:r>
-                    </a:p>
-                    <a:p>
-                      <a:pPr algn="ctr"/>
+                      <a:r>
+                        <a:rPr lang="en-US" sz="1400" dirty="0"/>
+                        <a:t>/</a:t>
+                      </a:r>
                       <a:r>
                         <a:rPr lang="ru-RU" sz="1400" dirty="0"/>
                         <a:t>Изменение</a:t>
                       </a:r>
-                    </a:p>
-                    <a:p>
-                      <a:pPr algn="ctr"/>
+                      <a:r>
+                        <a:rPr lang="en-US" sz="1400" dirty="0"/>
+                        <a:t>/</a:t>
+                      </a:r>
                       <a:r>
                         <a:rPr lang="ru-RU" sz="1400" dirty="0"/>
                         <a:t>Удаление</a:t>
@@ -19255,16 +19473,83 @@
                         <a:rPr lang="ru-RU" sz="1400" dirty="0"/>
                         <a:t>Создание</a:t>
                       </a:r>
+                      <a:r>
+                        <a:rPr lang="en-US" sz="1400" dirty="0"/>
+                        <a:t>/</a:t>
+                      </a:r>
+                      <a:r>
+                        <a:rPr lang="ru-RU" sz="1400" dirty="0"/>
+                        <a:t>Изменение</a:t>
+                      </a:r>
+                      <a:r>
+                        <a:rPr lang="en-US" sz="1400" dirty="0"/>
+                        <a:t>/</a:t>
+                      </a:r>
+                      <a:r>
+                        <a:rPr lang="ru-RU" sz="1400" dirty="0"/>
+                        <a:t>Удаление</a:t>
+                      </a:r>
                     </a:p>
+                  </a:txBody>
+                  <a:tcPr anchor="ctr"/>
+                </a:tc>
+                <a:tc>
+                  <a:txBody>
+                    <a:bodyPr/>
+                    <a:lstStyle/>
+                    <a:p>
+                      <a:pPr algn="ctr"/>
+                      <a:r>
+                        <a:rPr lang="ru-RU" sz="1400" dirty="0"/>
+                        <a:t>Чтение</a:t>
+                      </a:r>
+                      <a:r>
+                        <a:rPr lang="en-US" sz="1400" dirty="0"/>
+                        <a:t>/</a:t>
+                      </a:r>
+                      <a:r>
+                        <a:rPr lang="ru-RU" sz="1400" dirty="0"/>
+                        <a:t>Отправка ответа</a:t>
+                      </a:r>
+                    </a:p>
+                  </a:txBody>
+                  <a:tcPr anchor="ctr"/>
+                </a:tc>
+                <a:extLst>
+                  <a:ext uri="{0D108BD9-81ED-4DB2-BD59-A6C34878D82A}">
+                    <a16:rowId xmlns:a16="http://schemas.microsoft.com/office/drawing/2014/main" val="2648690231"/>
+                  </a:ext>
+                </a:extLst>
+              </a:tr>
+              <a:tr h="609143">
+                <a:tc>
+                  <a:txBody>
+                    <a:bodyPr/>
+                    <a:lstStyle/>
+                    <a:p>
+                      <a:pPr algn="ctr"/>
+                      <a:r>
+                        <a:rPr lang="ru-RU" sz="1600" dirty="0"/>
+                        <a:t>Состав преподавателей и учащихся</a:t>
+                      </a:r>
+                    </a:p>
+                  </a:txBody>
+                  <a:tcPr anchor="ctr"/>
+                </a:tc>
+                <a:tc>
+                  <a:txBody>
+                    <a:bodyPr/>
+                    <a:lstStyle/>
                     <a:p>
                       <a:pPr algn="ctr"/>
                       <a:r>
                         <a:rPr lang="ru-RU" sz="1400" dirty="0"/>
                         <a:t>Изменение</a:t>
                       </a:r>
-                    </a:p>
-                    <a:p>
-                      <a:pPr algn="ctr"/>
+                      <a:r>
+                        <a:rPr lang="en-US" sz="1400" dirty="0"/>
+                        <a:t>/</a:t>
+                      </a:r>
                       <a:r>
                         <a:rPr lang="ru-RU" sz="1400" dirty="0"/>
                         <a:t>Удаление</a:t>
@@ -19284,19 +19569,12 @@
                         <a:t>Чтение</a:t>
                       </a:r>
                     </a:p>
-                    <a:p>
-                      <a:pPr algn="ctr"/>
-                      <a:r>
-                        <a:rPr lang="ru-RU" sz="1400" dirty="0"/>
-                        <a:t>Создание ответа</a:t>
-                      </a:r>
-                    </a:p>
                   </a:txBody>
                   <a:tcPr anchor="ctr"/>
                 </a:tc>
                 <a:extLst>
                   <a:ext uri="{0D108BD9-81ED-4DB2-BD59-A6C34878D82A}">
-                    <a16:rowId xmlns:a16="http://schemas.microsoft.com/office/drawing/2014/main" val="2648690231"/>
+                    <a16:rowId xmlns:a16="http://schemas.microsoft.com/office/drawing/2014/main" val="3106446215"/>
                   </a:ext>
                 </a:extLst>
               </a:tr>
@@ -19393,6 +19671,35 @@
           <a:chExt cx="0" cy="0"/>
         </a:xfrm>
       </p:grpSpPr>
+      <p:pic>
+        <p:nvPicPr>
+          <p:cNvPr id="11" name="Рисунок 10">
+            <a:extLst>
+              <a:ext uri="{FF2B5EF4-FFF2-40B4-BE49-F238E27FC236}">
+                <a16:creationId xmlns:a16="http://schemas.microsoft.com/office/drawing/2014/main" id="{E28E6C54-4F3D-824F-6375-40C309B0B257}"/>
+              </a:ext>
+            </a:extLst>
+          </p:cNvPr>
+          <p:cNvPicPr>
+            <a:picLocks noChangeAspect="1"/>
+          </p:cNvPicPr>
+          <p:nvPr/>
+        </p:nvPicPr>
+        <p:blipFill rotWithShape="1">
+          <a:blip r:embed="rId2"/>
+          <a:srcRect l="7396" t="13722" r="7187" b="13722"/>
+          <a:stretch/>
+        </p:blipFill>
+        <p:spPr>
+          <a:xfrm>
+            <a:off x="3732102" y="2725784"/>
+            <a:ext cx="7874000" cy="3591312"/>
+          </a:xfrm>
+          <a:prstGeom prst="rect">
+            <a:avLst/>
+          </a:prstGeom>
+        </p:spPr>
+      </p:pic>
       <p:sp>
         <p:nvSpPr>
           <p:cNvPr id="3" name="Заголовок 2">
@@ -19527,35 +19834,314 @@
           </a:p>
         </p:txBody>
       </p:sp>
-      <p:pic>
-        <p:nvPicPr>
-          <p:cNvPr id="24" name="Рисунок 23">
-            <a:extLst>
-              <a:ext uri="{FF2B5EF4-FFF2-40B4-BE49-F238E27FC236}">
-                <a16:creationId xmlns:a16="http://schemas.microsoft.com/office/drawing/2014/main" id="{F2447FE1-0671-39E9-C1F2-1BE5EDA9BF62}"/>
-              </a:ext>
-            </a:extLst>
-          </p:cNvPr>
-          <p:cNvPicPr>
-            <a:picLocks noChangeAspect="1"/>
-          </p:cNvPicPr>
+      <p:sp>
+        <p:nvSpPr>
+          <p:cNvPr id="8" name="Текст 3">
+            <a:extLst>
+              <a:ext uri="{FF2B5EF4-FFF2-40B4-BE49-F238E27FC236}">
+                <a16:creationId xmlns:a16="http://schemas.microsoft.com/office/drawing/2014/main" id="{A7F2E570-BEDB-CD19-3639-6508242AA6F6}"/>
+              </a:ext>
+            </a:extLst>
+          </p:cNvPr>
+          <p:cNvSpPr txBox="1">
+            <a:spLocks/>
+          </p:cNvSpPr>
           <p:nvPr/>
-        </p:nvPicPr>
-        <p:blipFill rotWithShape="1">
-          <a:blip r:embed="rId2"/>
-          <a:srcRect l="5820" t="10778" r="4971" b="9920"/>
-          <a:stretch/>
-        </p:blipFill>
+        </p:nvSpPr>
         <p:spPr>
           <a:xfrm>
-            <a:off x="1517622" y="1952624"/>
-            <a:ext cx="8702140" cy="4356655"/>
+            <a:off x="584997" y="2057013"/>
+            <a:ext cx="11021105" cy="1143387"/>
           </a:xfrm>
           <a:prstGeom prst="rect">
             <a:avLst/>
           </a:prstGeom>
         </p:spPr>
-      </p:pic>
+        <p:txBody>
+          <a:bodyPr vert="horz" lIns="0" tIns="0" rIns="0" bIns="45720" rtlCol="0">
+            <a:noAutofit/>
+          </a:bodyPr>
+          <a:lstStyle>
+            <a:lvl1pPr marL="0" marR="0" indent="0" algn="l" defTabSz="914400" rtl="0" eaLnBrk="1" fontAlgn="auto" latinLnBrk="0" hangingPunct="1">
+              <a:lnSpc>
+                <a:spcPct val="100000"/>
+              </a:lnSpc>
+              <a:spcBef>
+                <a:spcPts val="1000"/>
+              </a:spcBef>
+              <a:spcAft>
+                <a:spcPts val="0"/>
+              </a:spcAft>
+              <a:buClrTx/>
+              <a:buSzTx/>
+              <a:buFont typeface="Arial" panose="020B0604020202020204" pitchFamily="34" charset="0"/>
+              <a:buNone/>
+              <a:tabLst/>
+              <a:defRPr sz="1300" b="0" i="0" kern="1200">
+                <a:solidFill>
+                  <a:srgbClr val="0E2D69"/>
+                </a:solidFill>
+                <a:latin typeface="HSE Sans" panose="02000000000000000000" pitchFamily="2" charset="0"/>
+                <a:ea typeface="+mn-ea"/>
+                <a:cs typeface="+mn-cs"/>
+              </a:defRPr>
+            </a:lvl1pPr>
+            <a:lvl2pPr marL="457200" indent="0" algn="l" defTabSz="914400" rtl="0" eaLnBrk="1" latinLnBrk="0" hangingPunct="1">
+              <a:lnSpc>
+                <a:spcPct val="100000"/>
+              </a:lnSpc>
+              <a:spcBef>
+                <a:spcPts val="1000"/>
+              </a:spcBef>
+              <a:buFont typeface="Arial" panose="020B0604020202020204" pitchFamily="34" charset="0"/>
+              <a:buNone/>
+              <a:defRPr sz="1300" b="0" i="0" kern="1200">
+                <a:solidFill>
+                  <a:srgbClr val="0E2D69"/>
+                </a:solidFill>
+                <a:latin typeface="HSE Sans" panose="02000000000000000000" pitchFamily="2" charset="0"/>
+                <a:ea typeface="+mn-ea"/>
+                <a:cs typeface="+mn-cs"/>
+              </a:defRPr>
+            </a:lvl2pPr>
+            <a:lvl3pPr marL="914400" indent="0" algn="l" defTabSz="914400" rtl="0" eaLnBrk="1" latinLnBrk="0" hangingPunct="1">
+              <a:lnSpc>
+                <a:spcPct val="100000"/>
+              </a:lnSpc>
+              <a:spcBef>
+                <a:spcPts val="1000"/>
+              </a:spcBef>
+              <a:buFont typeface="Arial" panose="020B0604020202020204" pitchFamily="34" charset="0"/>
+              <a:buNone/>
+              <a:defRPr sz="1300" b="0" i="0" kern="1200">
+                <a:solidFill>
+                  <a:srgbClr val="0E2D69"/>
+                </a:solidFill>
+                <a:latin typeface="HSE Sans" panose="02000000000000000000" pitchFamily="2" charset="0"/>
+                <a:ea typeface="+mn-ea"/>
+                <a:cs typeface="+mn-cs"/>
+              </a:defRPr>
+            </a:lvl3pPr>
+            <a:lvl4pPr marL="1371600" indent="0" algn="l" defTabSz="914400" rtl="0" eaLnBrk="1" latinLnBrk="0" hangingPunct="1">
+              <a:lnSpc>
+                <a:spcPct val="100000"/>
+              </a:lnSpc>
+              <a:spcBef>
+                <a:spcPts val="1000"/>
+              </a:spcBef>
+              <a:buFont typeface="Arial" panose="020B0604020202020204" pitchFamily="34" charset="0"/>
+              <a:buNone/>
+              <a:defRPr sz="1300" b="0" i="0" kern="1200">
+                <a:solidFill>
+                  <a:srgbClr val="0E2D69"/>
+                </a:solidFill>
+                <a:latin typeface="HSE Sans" panose="02000000000000000000" pitchFamily="2" charset="0"/>
+                <a:ea typeface="+mn-ea"/>
+                <a:cs typeface="+mn-cs"/>
+              </a:defRPr>
+            </a:lvl4pPr>
+            <a:lvl5pPr marL="1828800" indent="0" algn="l" defTabSz="914400" rtl="0" eaLnBrk="1" latinLnBrk="0" hangingPunct="1">
+              <a:lnSpc>
+                <a:spcPct val="100000"/>
+              </a:lnSpc>
+              <a:spcBef>
+                <a:spcPts val="1000"/>
+              </a:spcBef>
+              <a:buFont typeface="Arial" panose="020B0604020202020204" pitchFamily="34" charset="0"/>
+              <a:buNone/>
+              <a:defRPr sz="1300" b="0" i="0" kern="1200">
+                <a:solidFill>
+                  <a:srgbClr val="0E2D69"/>
+                </a:solidFill>
+                <a:latin typeface="HSE Sans" panose="02000000000000000000" pitchFamily="2" charset="0"/>
+                <a:ea typeface="+mn-ea"/>
+                <a:cs typeface="+mn-cs"/>
+              </a:defRPr>
+            </a:lvl5pPr>
+            <a:lvl6pPr marL="2514600" indent="-228600" algn="l" defTabSz="914400" rtl="0" eaLnBrk="1" latinLnBrk="0" hangingPunct="1">
+              <a:lnSpc>
+                <a:spcPct val="90000"/>
+              </a:lnSpc>
+              <a:spcBef>
+                <a:spcPts val="500"/>
+              </a:spcBef>
+              <a:buFont typeface="Arial" panose="020B0604020202020204" pitchFamily="34" charset="0"/>
+              <a:buChar char="•"/>
+              <a:defRPr sz="1800" kern="1200">
+                <a:solidFill>
+                  <a:schemeClr val="tx1"/>
+                </a:solidFill>
+                <a:latin typeface="+mn-lt"/>
+                <a:ea typeface="+mn-ea"/>
+                <a:cs typeface="+mn-cs"/>
+              </a:defRPr>
+            </a:lvl6pPr>
+            <a:lvl7pPr marL="2971800" indent="-228600" algn="l" defTabSz="914400" rtl="0" eaLnBrk="1" latinLnBrk="0" hangingPunct="1">
+              <a:lnSpc>
+                <a:spcPct val="90000"/>
+              </a:lnSpc>
+              <a:spcBef>
+                <a:spcPts val="500"/>
+              </a:spcBef>
+              <a:buFont typeface="Arial" panose="020B0604020202020204" pitchFamily="34" charset="0"/>
+              <a:buChar char="•"/>
+              <a:defRPr sz="1800" kern="1200">
+                <a:solidFill>
+                  <a:schemeClr val="tx1"/>
+                </a:solidFill>
+                <a:latin typeface="+mn-lt"/>
+                <a:ea typeface="+mn-ea"/>
+                <a:cs typeface="+mn-cs"/>
+              </a:defRPr>
+            </a:lvl7pPr>
+            <a:lvl8pPr marL="3429000" indent="-228600" algn="l" defTabSz="914400" rtl="0" eaLnBrk="1" latinLnBrk="0" hangingPunct="1">
+              <a:lnSpc>
+                <a:spcPct val="90000"/>
+              </a:lnSpc>
+              <a:spcBef>
+                <a:spcPts val="500"/>
+              </a:spcBef>
+              <a:buFont typeface="Arial" panose="020B0604020202020204" pitchFamily="34" charset="0"/>
+              <a:buChar char="•"/>
+              <a:defRPr sz="1800" kern="1200">
+                <a:solidFill>
+                  <a:schemeClr val="tx1"/>
+                </a:solidFill>
+                <a:latin typeface="+mn-lt"/>
+                <a:ea typeface="+mn-ea"/>
+                <a:cs typeface="+mn-cs"/>
+              </a:defRPr>
+            </a:lvl8pPr>
+            <a:lvl9pPr marL="3886200" indent="-228600" algn="l" defTabSz="914400" rtl="0" eaLnBrk="1" latinLnBrk="0" hangingPunct="1">
+              <a:lnSpc>
+                <a:spcPct val="90000"/>
+              </a:lnSpc>
+              <a:spcBef>
+                <a:spcPts val="500"/>
+              </a:spcBef>
+              <a:buFont typeface="Arial" panose="020B0604020202020204" pitchFamily="34" charset="0"/>
+              <a:buChar char="•"/>
+              <a:defRPr sz="1800" kern="1200">
+                <a:solidFill>
+                  <a:schemeClr val="tx1"/>
+                </a:solidFill>
+                <a:latin typeface="+mn-lt"/>
+                <a:ea typeface="+mn-ea"/>
+                <a:cs typeface="+mn-cs"/>
+              </a:defRPr>
+            </a:lvl9pPr>
+          </a:lstStyle>
+          <a:p>
+            <a:pPr marL="342900" indent="-342900" algn="just">
+              <a:buAutoNum type="arabicPeriod"/>
+            </a:pPr>
+            <a:r>
+              <a:rPr lang="ru-RU" sz="1800" dirty="0">
+                <a:latin typeface="Calibri" panose="020F0502020204030204" pitchFamily="34" charset="0"/>
+                <a:ea typeface="Calibri" panose="020F0502020204030204" pitchFamily="34" charset="0"/>
+                <a:cs typeface="Times New Roman" panose="02020603050405020304" pitchFamily="18" charset="0"/>
+              </a:rPr>
+              <a:t>Серверная часть</a:t>
+            </a:r>
+            <a:r>
+              <a:rPr lang="en-US" sz="1800" dirty="0">
+                <a:latin typeface="Calibri" panose="020F0502020204030204" pitchFamily="34" charset="0"/>
+                <a:ea typeface="Calibri" panose="020F0502020204030204" pitchFamily="34" charset="0"/>
+                <a:cs typeface="Times New Roman" panose="02020603050405020304" pitchFamily="18" charset="0"/>
+              </a:rPr>
+              <a:t> </a:t>
+            </a:r>
+            <a:r>
+              <a:rPr lang="ru-RU" sz="1800" dirty="0">
+                <a:latin typeface="Calibri" panose="020F0502020204030204" pitchFamily="34" charset="0"/>
+                <a:ea typeface="Calibri" panose="020F0502020204030204" pitchFamily="34" charset="0"/>
+                <a:cs typeface="Times New Roman" panose="02020603050405020304" pitchFamily="18" charset="0"/>
+              </a:rPr>
+              <a:t>разбита на слои: </a:t>
+            </a:r>
+            <a:r>
+              <a:rPr lang="en-US" sz="1800" dirty="0">
+                <a:latin typeface="Calibri" panose="020F0502020204030204" pitchFamily="34" charset="0"/>
+                <a:ea typeface="Calibri" panose="020F0502020204030204" pitchFamily="34" charset="0"/>
+                <a:cs typeface="Times New Roman" panose="02020603050405020304" pitchFamily="18" charset="0"/>
+              </a:rPr>
+              <a:t>MVC-</a:t>
+            </a:r>
+            <a:r>
+              <a:rPr lang="ru-RU" sz="1800" dirty="0">
+                <a:latin typeface="Calibri" panose="020F0502020204030204" pitchFamily="34" charset="0"/>
+                <a:ea typeface="Calibri" panose="020F0502020204030204" pitchFamily="34" charset="0"/>
+                <a:cs typeface="Times New Roman" panose="02020603050405020304" pitchFamily="18" charset="0"/>
+              </a:rPr>
+              <a:t>архитектура (</a:t>
+            </a:r>
+            <a:r>
+              <a:rPr lang="en-US" sz="1800" dirty="0">
+                <a:latin typeface="Calibri" panose="020F0502020204030204" pitchFamily="34" charset="0"/>
+                <a:ea typeface="Calibri" panose="020F0502020204030204" pitchFamily="34" charset="0"/>
+                <a:cs typeface="Times New Roman" panose="02020603050405020304" pitchFamily="18" charset="0"/>
+              </a:rPr>
+              <a:t>Model-View-Controller);</a:t>
+            </a:r>
+            <a:endParaRPr lang="en-US" sz="1800" dirty="0">
+              <a:effectLst/>
+              <a:latin typeface="Calibri" panose="020F0502020204030204" pitchFamily="34" charset="0"/>
+              <a:ea typeface="Calibri" panose="020F0502020204030204" pitchFamily="34" charset="0"/>
+              <a:cs typeface="Times New Roman" panose="02020603050405020304" pitchFamily="18" charset="0"/>
+            </a:endParaRPr>
+          </a:p>
+          <a:p>
+            <a:pPr marL="342900" indent="-342900" algn="just">
+              <a:buAutoNum type="arabicPeriod"/>
+            </a:pPr>
+            <a:r>
+              <a:rPr lang="ru-RU" sz="1800" dirty="0">
+                <a:latin typeface="Calibri" panose="020F0502020204030204" pitchFamily="34" charset="0"/>
+                <a:ea typeface="Calibri" panose="020F0502020204030204" pitchFamily="34" charset="0"/>
+                <a:cs typeface="Times New Roman" panose="02020603050405020304" pitchFamily="18" charset="0"/>
+              </a:rPr>
+              <a:t>Работа с базой данных: </a:t>
+            </a:r>
+            <a:r>
+              <a:rPr lang="en-US" sz="1800" dirty="0">
+                <a:latin typeface="Calibri" panose="020F0502020204030204" pitchFamily="34" charset="0"/>
+                <a:ea typeface="Calibri" panose="020F0502020204030204" pitchFamily="34" charset="0"/>
+                <a:cs typeface="Times New Roman" panose="02020603050405020304" pitchFamily="18" charset="0"/>
+              </a:rPr>
+              <a:t>ORM (Object-Relational Mapping)</a:t>
+            </a:r>
+            <a:r>
+              <a:rPr lang="en-US" sz="1800" dirty="0"/>
+              <a:t>;</a:t>
+            </a:r>
+            <a:endParaRPr lang="ru-RU" sz="1800" dirty="0"/>
+          </a:p>
+          <a:p>
+            <a:pPr marL="342900" indent="-342900" algn="just">
+              <a:buAutoNum type="arabicPeriod"/>
+            </a:pPr>
+            <a:r>
+              <a:rPr lang="ru-RU" sz="1800" dirty="0"/>
+              <a:t>Передача информации</a:t>
+            </a:r>
+            <a:r>
+              <a:rPr lang="en-US" sz="1800" dirty="0"/>
+              <a:t>: DTO (Data Transfer Object);</a:t>
+            </a:r>
+            <a:endParaRPr lang="ru-RU" sz="1800" dirty="0"/>
+          </a:p>
+          <a:p>
+            <a:pPr algn="just"/>
+            <a:endParaRPr lang="en-US" sz="1800" dirty="0"/>
+          </a:p>
+          <a:p>
+            <a:pPr marL="342900" indent="-342900" algn="just">
+              <a:buAutoNum type="arabicPeriod"/>
+            </a:pPr>
+            <a:endParaRPr lang="ru-RU" sz="1800" dirty="0"/>
+          </a:p>
+        </p:txBody>
+      </p:sp>
     </p:spTree>
     <p:extLst>
       <p:ext uri="{BB962C8B-B14F-4D97-AF65-F5344CB8AC3E}">
@@ -19586,6 +20172,35 @@
           <a:chExt cx="0" cy="0"/>
         </a:xfrm>
       </p:grpSpPr>
+      <p:pic>
+        <p:nvPicPr>
+          <p:cNvPr id="4" name="Рисунок 3">
+            <a:extLst>
+              <a:ext uri="{FF2B5EF4-FFF2-40B4-BE49-F238E27FC236}">
+                <a16:creationId xmlns:a16="http://schemas.microsoft.com/office/drawing/2014/main" id="{69A917C9-888F-C37F-5BDF-C0FAC2EE443D}"/>
+              </a:ext>
+            </a:extLst>
+          </p:cNvPr>
+          <p:cNvPicPr>
+            <a:picLocks noChangeAspect="1"/>
+          </p:cNvPicPr>
+          <p:nvPr/>
+        </p:nvPicPr>
+        <p:blipFill rotWithShape="1">
+          <a:blip r:embed="rId2"/>
+          <a:srcRect t="2443" b="2760"/>
+          <a:stretch/>
+        </p:blipFill>
+        <p:spPr>
+          <a:xfrm>
+            <a:off x="1398295" y="1611984"/>
+            <a:ext cx="8261936" cy="4835950"/>
+          </a:xfrm>
+          <a:prstGeom prst="rect">
+            <a:avLst/>
+          </a:prstGeom>
+        </p:spPr>
+      </p:pic>
       <p:sp>
         <p:nvSpPr>
           <p:cNvPr id="3" name="Заголовок 2">
@@ -19604,7 +20219,7 @@
         </p:nvSpPr>
         <p:spPr>
           <a:xfrm>
-            <a:off x="585897" y="1447790"/>
+            <a:off x="585897" y="1155559"/>
             <a:ext cx="6819391" cy="777025"/>
           </a:xfrm>
         </p:spPr>
@@ -19720,36 +20335,6 @@
           </a:p>
         </p:txBody>
       </p:sp>
-      <p:pic>
-        <p:nvPicPr>
-          <p:cNvPr id="8" name="Рисунок 7">
-            <a:extLst>
-              <a:ext uri="{FF2B5EF4-FFF2-40B4-BE49-F238E27FC236}">
-                <a16:creationId xmlns:a16="http://schemas.microsoft.com/office/drawing/2014/main" id="{5C2C3549-62D5-FF1D-69B9-6A919FDA50AA}"/>
-              </a:ext>
-            </a:extLst>
-          </p:cNvPr>
-          <p:cNvPicPr>
-            <a:picLocks noChangeAspect="1"/>
-          </p:cNvPicPr>
-          <p:nvPr/>
-        </p:nvPicPr>
-        <p:blipFill>
-          <a:blip r:embed="rId2"/>
-          <a:stretch>
-            <a:fillRect/>
-          </a:stretch>
-        </p:blipFill>
-        <p:spPr>
-          <a:xfrm>
-            <a:off x="5117890" y="1123950"/>
-            <a:ext cx="5484255" cy="5281826"/>
-          </a:xfrm>
-          <a:prstGeom prst="rect">
-            <a:avLst/>
-          </a:prstGeom>
-        </p:spPr>
-      </p:pic>
     </p:spTree>
     <p:extLst>
       <p:ext uri="{BB962C8B-B14F-4D97-AF65-F5344CB8AC3E}">
@@ -20898,12 +21483,9 @@
 </file>
 
 <file path=customXml/item1.xml><?xml version="1.0" encoding="utf-8"?>
-<?mso-contentType ?>
-<FormTemplates xmlns="http://schemas.microsoft.com/sharepoint/v3/contenttype/forms">
-  <Display>DocumentLibraryForm</Display>
-  <Edit>DocumentLibraryForm</Edit>
-  <New>DocumentLibraryForm</New>
-</FormTemplates>
+<p:properties xmlns:p="http://schemas.microsoft.com/office/2006/metadata/properties" xmlns:xsi="http://www.w3.org/2001/XMLSchema-instance" xmlns:pc="http://schemas.microsoft.com/office/infopath/2007/PartnerControls">
+  <documentManagement/>
+</p:properties>
 </file>
 
 <file path=customXml/item2.xml><?xml version="1.0" encoding="utf-8"?>
@@ -21130,15 +21712,27 @@
 </file>
 
 <file path=customXml/item3.xml><?xml version="1.0" encoding="utf-8"?>
-<p:properties xmlns:p="http://schemas.microsoft.com/office/2006/metadata/properties" xmlns:xsi="http://www.w3.org/2001/XMLSchema-instance" xmlns:pc="http://schemas.microsoft.com/office/infopath/2007/PartnerControls">
-  <documentManagement/>
-</p:properties>
+<?mso-contentType ?>
+<FormTemplates xmlns="http://schemas.microsoft.com/sharepoint/v3/contenttype/forms">
+  <Display>DocumentLibraryForm</Display>
+  <Edit>DocumentLibraryForm</Edit>
+  <New>DocumentLibraryForm</New>
+</FormTemplates>
 </file>
 
 <file path=customXml/itemProps1.xml><?xml version="1.0" encoding="utf-8"?>
-<ds:datastoreItem xmlns:ds="http://schemas.openxmlformats.org/officeDocument/2006/customXml" ds:itemID="{B34386AA-1848-4C75-B336-1053927CB025}">
+<ds:datastoreItem xmlns:ds="http://schemas.openxmlformats.org/officeDocument/2006/customXml" ds:itemID="{433DAF31-D8A6-49A0-9A5D-8B2EA5B1C511}">
   <ds:schemaRefs>
-    <ds:schemaRef ds:uri="http://schemas.microsoft.com/sharepoint/v3/contenttype/forms"/>
+    <ds:schemaRef ds:uri="http://purl.org/dc/elements/1.1/"/>
+    <ds:schemaRef ds:uri="http://schemas.microsoft.com/office/2006/documentManagement/types"/>
+    <ds:schemaRef ds:uri="http://schemas.microsoft.com/office/infopath/2007/PartnerControls"/>
+    <ds:schemaRef ds:uri="http://purl.org/dc/dcmitype/"/>
+    <ds:schemaRef ds:uri="e96afe77-3acb-4328-97fc-408e1bde3ecd"/>
+    <ds:schemaRef ds:uri="http://schemas.microsoft.com/office/2006/metadata/properties"/>
+    <ds:schemaRef ds:uri="http://purl.org/dc/terms/"/>
+    <ds:schemaRef ds:uri="http://www.w3.org/XML/1998/namespace"/>
+    <ds:schemaRef ds:uri="http://schemas.openxmlformats.org/package/2006/metadata/core-properties"/>
+    <ds:schemaRef ds:uri="9875bd71-cde8-496c-a136-433f55d5e6d0"/>
   </ds:schemaRefs>
 </ds:datastoreItem>
 </file>
@@ -21163,18 +21757,9 @@
 </file>
 
 <file path=customXml/itemProps3.xml><?xml version="1.0" encoding="utf-8"?>
-<ds:datastoreItem xmlns:ds="http://schemas.openxmlformats.org/officeDocument/2006/customXml" ds:itemID="{433DAF31-D8A6-49A0-9A5D-8B2EA5B1C511}">
+<ds:datastoreItem xmlns:ds="http://schemas.openxmlformats.org/officeDocument/2006/customXml" ds:itemID="{B34386AA-1848-4C75-B336-1053927CB025}">
   <ds:schemaRefs>
-    <ds:schemaRef ds:uri="http://purl.org/dc/elements/1.1/"/>
-    <ds:schemaRef ds:uri="http://schemas.microsoft.com/office/2006/documentManagement/types"/>
-    <ds:schemaRef ds:uri="http://schemas.microsoft.com/office/infopath/2007/PartnerControls"/>
-    <ds:schemaRef ds:uri="http://purl.org/dc/dcmitype/"/>
-    <ds:schemaRef ds:uri="e96afe77-3acb-4328-97fc-408e1bde3ecd"/>
-    <ds:schemaRef ds:uri="http://schemas.microsoft.com/office/2006/metadata/properties"/>
-    <ds:schemaRef ds:uri="http://purl.org/dc/terms/"/>
-    <ds:schemaRef ds:uri="http://www.w3.org/XML/1998/namespace"/>
-    <ds:schemaRef ds:uri="http://schemas.openxmlformats.org/package/2006/metadata/core-properties"/>
-    <ds:schemaRef ds:uri="9875bd71-cde8-496c-a136-433f55d5e6d0"/>
+    <ds:schemaRef ds:uri="http://schemas.microsoft.com/sharepoint/v3/contenttype/forms"/>
   </ds:schemaRefs>
 </ds:datastoreItem>
 </file>
</xml_diff>

<commit_message>
sad vibes. need to ml. got 5/10
</commit_message>
<xml_diff>
--- a/docs/Дадыков_Артемий_Презентация.pptx
+++ b/docs/Дадыков_Артемий_Презентация.pptx
@@ -14327,8 +14327,8 @@
         </p:nvSpPr>
         <p:spPr>
           <a:xfrm>
-            <a:off x="1009618" y="5017299"/>
-            <a:ext cx="5867508" cy="652860"/>
+            <a:off x="1009618" y="5017298"/>
+            <a:ext cx="5867508" cy="931011"/>
           </a:xfrm>
           <a:prstGeom prst="rect">
             <a:avLst/>
@@ -14519,6 +14519,12 @@
             <a:r>
               <a:rPr lang="ru-RU" sz="1500" dirty="0"/>
               <a:t>Аспирант факультета компьютерных наук департамента программной инженерии, штатный преподаватель факультета компьютерных наук</a:t>
+            </a:r>
+          </a:p>
+          <a:p>
+            <a:r>
+              <a:rPr lang="ru-RU" sz="1500" dirty="0"/>
+              <a:t>Терлыч Никита Андреевич</a:t>
             </a:r>
           </a:p>
         </p:txBody>
@@ -14902,8 +14908,8 @@
         </p:nvSpPr>
         <p:spPr>
           <a:xfrm>
-            <a:off x="585895" y="2069028"/>
-            <a:ext cx="11161605" cy="4407972"/>
+            <a:off x="585895" y="1984187"/>
+            <a:ext cx="11161605" cy="4680564"/>
           </a:xfrm>
         </p:spPr>
         <p:txBody>
@@ -15065,9 +15071,17 @@
             </a:r>
             <a:r>
               <a:rPr lang="en-US" sz="1800" dirty="0"/>
-              <a:t>.</a:t>
-            </a:r>
-            <a:endParaRPr lang="ru-RU" sz="1800" dirty="0"/>
+              <a:t>;</a:t>
+            </a:r>
+          </a:p>
+          <a:p>
+            <a:pPr marL="342900" indent="-342900" algn="just">
+              <a:buAutoNum type="arabicPeriod"/>
+            </a:pPr>
+            <a:r>
+              <a:rPr lang="ru-RU" sz="1800" dirty="0"/>
+              <a:t>Хранить статичные данные на отдельном сервере.</a:t>
+            </a:r>
           </a:p>
         </p:txBody>
       </p:sp>
@@ -15253,8 +15267,8 @@
         </p:nvSpPr>
         <p:spPr>
           <a:xfrm>
-            <a:off x="578881" y="1900682"/>
-            <a:ext cx="11362021" cy="2768733"/>
+            <a:off x="585890" y="1827707"/>
+            <a:ext cx="10468391" cy="3658147"/>
           </a:xfrm>
         </p:spPr>
         <p:txBody>
@@ -15267,11 +15281,11 @@
               <a:buAutoNum type="arabicPeriod"/>
             </a:pPr>
             <a:r>
-              <a:rPr lang="en-US" sz="1800" dirty="0"/>
+              <a:rPr lang="en-US" sz="1600" dirty="0"/>
               <a:t>Python </a:t>
             </a:r>
             <a:r>
-              <a:rPr lang="en-US" sz="1800" dirty="0">
+              <a:rPr lang="en-US" sz="1600" dirty="0">
                 <a:effectLst/>
                 <a:latin typeface="HSE Sans" panose="02000000000000000000"/>
                 <a:ea typeface="Calibri" panose="020F0502020204030204" pitchFamily="34" charset="0"/>
@@ -15279,7 +15293,7 @@
               <a:t>[</a:t>
             </a:r>
             <a:r>
-              <a:rPr lang="ru-RU" sz="1800" dirty="0">
+              <a:rPr lang="ru-RU" sz="1600" dirty="0">
                 <a:effectLst/>
                 <a:latin typeface="HSE Sans" panose="02000000000000000000"/>
                 <a:ea typeface="Calibri" panose="020F0502020204030204" pitchFamily="34" charset="0"/>
@@ -15287,7 +15301,7 @@
               <a:t>Электронный ресурс</a:t>
             </a:r>
             <a:r>
-              <a:rPr lang="en-US" sz="1800" dirty="0">
+              <a:rPr lang="en-US" sz="1600" dirty="0">
                 <a:effectLst/>
                 <a:latin typeface="HSE Sans" panose="02000000000000000000"/>
                 <a:ea typeface="Calibri" panose="020F0502020204030204" pitchFamily="34" charset="0"/>
@@ -15295,7 +15309,7 @@
               <a:t>]</a:t>
             </a:r>
             <a:r>
-              <a:rPr lang="ru-RU" sz="1800" dirty="0">
+              <a:rPr lang="ru-RU" sz="1600" dirty="0">
                 <a:effectLst/>
                 <a:latin typeface="HSE Sans" panose="02000000000000000000"/>
                 <a:ea typeface="Calibri" panose="020F0502020204030204" pitchFamily="34" charset="0"/>
@@ -15303,7 +15317,7 @@
               <a:t>. </a:t>
             </a:r>
             <a:r>
-              <a:rPr lang="en-US" sz="1800" dirty="0">
+              <a:rPr lang="en-US" sz="1600" dirty="0">
                 <a:effectLst/>
                 <a:latin typeface="HSE Sans" panose="02000000000000000000"/>
                 <a:ea typeface="Calibri" panose="020F0502020204030204" pitchFamily="34" charset="0"/>
@@ -15311,7 +15325,7 @@
               <a:t>URL: </a:t>
             </a:r>
             <a:r>
-              <a:rPr lang="en-US" sz="1800" dirty="0">
+              <a:rPr lang="en-US" sz="1600" dirty="0">
                 <a:effectLst/>
                 <a:latin typeface="HSE Sans" panose="02000000000000000000"/>
                 <a:ea typeface="Calibri" panose="020F0502020204030204" pitchFamily="34" charset="0"/>
@@ -15320,33 +15334,33 @@
               <a:t>https://docs.python.org/3</a:t>
             </a:r>
             <a:r>
-              <a:rPr lang="en-US" sz="1800" dirty="0">
+              <a:rPr lang="en-US" sz="1600" dirty="0">
                 <a:effectLst/>
                 <a:latin typeface="HSE Sans" panose="02000000000000000000"/>
                 <a:ea typeface="Calibri" panose="020F0502020204030204" pitchFamily="34" charset="0"/>
               </a:rPr>
               <a:t>;</a:t>
             </a:r>
-            <a:endParaRPr lang="en-US" sz="1800" dirty="0"/>
+            <a:endParaRPr lang="en-US" sz="1600" dirty="0"/>
           </a:p>
           <a:p>
             <a:pPr marL="342900" indent="-342900" algn="just">
               <a:buAutoNum type="arabicPeriod"/>
             </a:pPr>
             <a:r>
-              <a:rPr lang="en-US" sz="1800" dirty="0"/>
+              <a:rPr lang="en-US" sz="1600" dirty="0"/>
               <a:t>Python </a:t>
             </a:r>
             <a:r>
-              <a:rPr lang="en-US" sz="1800" dirty="0" err="1"/>
+              <a:rPr lang="en-US" sz="1600" dirty="0" err="1"/>
               <a:t>FastApi</a:t>
             </a:r>
             <a:r>
-              <a:rPr lang="en-US" sz="1800" dirty="0"/>
+              <a:rPr lang="en-US" sz="1600" dirty="0"/>
               <a:t> </a:t>
             </a:r>
             <a:r>
-              <a:rPr lang="en-US" sz="1800" dirty="0">
+              <a:rPr lang="en-US" sz="1600" dirty="0">
                 <a:effectLst/>
                 <a:latin typeface="HSE Sans" panose="02000000000000000000"/>
                 <a:ea typeface="Calibri" panose="020F0502020204030204" pitchFamily="34" charset="0"/>
@@ -15354,7 +15368,7 @@
               <a:t>[</a:t>
             </a:r>
             <a:r>
-              <a:rPr lang="ru-RU" sz="1800" dirty="0">
+              <a:rPr lang="ru-RU" sz="1600" dirty="0">
                 <a:effectLst/>
                 <a:latin typeface="HSE Sans" panose="02000000000000000000"/>
                 <a:ea typeface="Calibri" panose="020F0502020204030204" pitchFamily="34" charset="0"/>
@@ -15362,7 +15376,7 @@
               <a:t>Электронный ресурс</a:t>
             </a:r>
             <a:r>
-              <a:rPr lang="en-US" sz="1800" dirty="0">
+              <a:rPr lang="en-US" sz="1600" dirty="0">
                 <a:effectLst/>
                 <a:latin typeface="HSE Sans" panose="02000000000000000000"/>
                 <a:ea typeface="Calibri" panose="020F0502020204030204" pitchFamily="34" charset="0"/>
@@ -15370,7 +15384,7 @@
               <a:t>]</a:t>
             </a:r>
             <a:r>
-              <a:rPr lang="ru-RU" sz="1800" dirty="0">
+              <a:rPr lang="ru-RU" sz="1600" dirty="0">
                 <a:effectLst/>
                 <a:latin typeface="HSE Sans" panose="02000000000000000000"/>
                 <a:ea typeface="Calibri" panose="020F0502020204030204" pitchFamily="34" charset="0"/>
@@ -15378,7 +15392,7 @@
               <a:t>. </a:t>
             </a:r>
             <a:r>
-              <a:rPr lang="en-US" sz="1800" dirty="0">
+              <a:rPr lang="en-US" sz="1600" dirty="0">
                 <a:effectLst/>
                 <a:latin typeface="HSE Sans" panose="02000000000000000000"/>
                 <a:ea typeface="Calibri" panose="020F0502020204030204" pitchFamily="34" charset="0"/>
@@ -15386,7 +15400,7 @@
               <a:t>URL: </a:t>
             </a:r>
             <a:r>
-              <a:rPr lang="en-US" sz="1800" dirty="0">
+              <a:rPr lang="en-US" sz="1600" dirty="0">
                 <a:latin typeface="HSE Sans" panose="02000000000000000000"/>
                 <a:ea typeface="Calibri" panose="020F0502020204030204" pitchFamily="34" charset="0"/>
                 <a:hlinkClick r:id="rId3"/>
@@ -15394,32 +15408,32 @@
               <a:t>https://fastapi.tiangolo.com</a:t>
             </a:r>
             <a:r>
-              <a:rPr lang="en-US" sz="1800" dirty="0">
+              <a:rPr lang="en-US" sz="1600" dirty="0">
                 <a:latin typeface="HSE Sans" panose="02000000000000000000"/>
                 <a:ea typeface="Calibri" panose="020F0502020204030204" pitchFamily="34" charset="0"/>
               </a:rPr>
               <a:t>;</a:t>
             </a:r>
-            <a:endParaRPr lang="en-US" sz="1800" dirty="0"/>
+            <a:endParaRPr lang="en-US" sz="1600" dirty="0"/>
           </a:p>
           <a:p>
             <a:pPr marL="342900" indent="-342900" algn="just">
               <a:buAutoNum type="arabicPeriod"/>
             </a:pPr>
             <a:r>
-              <a:rPr lang="en-US" sz="1800" dirty="0"/>
+              <a:rPr lang="en-US" sz="1600" dirty="0"/>
               <a:t>Python </a:t>
             </a:r>
             <a:r>
-              <a:rPr lang="en-US" sz="1800" dirty="0" err="1"/>
+              <a:rPr lang="en-US" sz="1600" dirty="0" err="1"/>
               <a:t>SQLAlchemy</a:t>
             </a:r>
             <a:r>
-              <a:rPr lang="ru-RU" sz="1800" dirty="0"/>
+              <a:rPr lang="ru-RU" sz="1600" dirty="0"/>
               <a:t> </a:t>
             </a:r>
             <a:r>
-              <a:rPr lang="en-US" sz="1800" dirty="0">
+              <a:rPr lang="en-US" sz="1600" dirty="0">
                 <a:effectLst/>
                 <a:latin typeface="HSE Sans" panose="02000000000000000000"/>
                 <a:ea typeface="Calibri" panose="020F0502020204030204" pitchFamily="34" charset="0"/>
@@ -15427,7 +15441,7 @@
               <a:t>[</a:t>
             </a:r>
             <a:r>
-              <a:rPr lang="ru-RU" sz="1800" dirty="0">
+              <a:rPr lang="ru-RU" sz="1600" dirty="0">
                 <a:effectLst/>
                 <a:latin typeface="HSE Sans" panose="02000000000000000000"/>
                 <a:ea typeface="Calibri" panose="020F0502020204030204" pitchFamily="34" charset="0"/>
@@ -15435,7 +15449,7 @@
               <a:t>Электронный ресурс</a:t>
             </a:r>
             <a:r>
-              <a:rPr lang="en-US" sz="1800" dirty="0">
+              <a:rPr lang="en-US" sz="1600" dirty="0">
                 <a:effectLst/>
                 <a:latin typeface="HSE Sans" panose="02000000000000000000"/>
                 <a:ea typeface="Calibri" panose="020F0502020204030204" pitchFamily="34" charset="0"/>
@@ -15443,7 +15457,7 @@
               <a:t>]</a:t>
             </a:r>
             <a:r>
-              <a:rPr lang="ru-RU" sz="1800" dirty="0">
+              <a:rPr lang="ru-RU" sz="1600" dirty="0">
                 <a:effectLst/>
                 <a:latin typeface="HSE Sans" panose="02000000000000000000"/>
                 <a:ea typeface="Calibri" panose="020F0502020204030204" pitchFamily="34" charset="0"/>
@@ -15451,7 +15465,7 @@
               <a:t>. </a:t>
             </a:r>
             <a:r>
-              <a:rPr lang="en-US" sz="1800" dirty="0">
+              <a:rPr lang="en-US" sz="1600" dirty="0">
                 <a:effectLst/>
                 <a:latin typeface="HSE Sans" panose="02000000000000000000"/>
                 <a:ea typeface="Calibri" panose="020F0502020204030204" pitchFamily="34" charset="0"/>
@@ -15459,7 +15473,7 @@
               <a:t>URL: </a:t>
             </a:r>
             <a:r>
-              <a:rPr lang="en-US" sz="1800" dirty="0">
+              <a:rPr lang="en-US" sz="1600" dirty="0">
                 <a:latin typeface="HSE Sans" panose="02000000000000000000"/>
                 <a:ea typeface="Calibri" panose="020F0502020204030204" pitchFamily="34" charset="0"/>
                 <a:hlinkClick r:id="rId4"/>
@@ -15467,24 +15481,24 @@
               <a:t>https://www.sqlalchemy.org/library.html</a:t>
             </a:r>
             <a:r>
-              <a:rPr lang="en-US" sz="1800" dirty="0">
+              <a:rPr lang="en-US" sz="1600" dirty="0">
                 <a:latin typeface="HSE Sans" panose="02000000000000000000"/>
                 <a:ea typeface="Calibri" panose="020F0502020204030204" pitchFamily="34" charset="0"/>
               </a:rPr>
               <a:t>;</a:t>
             </a:r>
-            <a:endParaRPr lang="ru-RU" sz="1800" dirty="0"/>
+            <a:endParaRPr lang="ru-RU" sz="1600" dirty="0"/>
           </a:p>
           <a:p>
             <a:pPr marL="342900" indent="-342900" algn="just">
               <a:buAutoNum type="arabicPeriod"/>
             </a:pPr>
             <a:r>
-              <a:rPr lang="en-US" sz="1800" dirty="0"/>
+              <a:rPr lang="en-US" sz="1600" dirty="0"/>
               <a:t>PostgreSQL </a:t>
             </a:r>
             <a:r>
-              <a:rPr lang="en-US" sz="1800" dirty="0">
+              <a:rPr lang="en-US" sz="1600" dirty="0">
                 <a:effectLst/>
                 <a:latin typeface="HSE Sans" panose="02000000000000000000"/>
                 <a:ea typeface="Calibri" panose="020F0502020204030204" pitchFamily="34" charset="0"/>
@@ -15492,7 +15506,7 @@
               <a:t>[</a:t>
             </a:r>
             <a:r>
-              <a:rPr lang="ru-RU" sz="1800" dirty="0">
+              <a:rPr lang="ru-RU" sz="1600" dirty="0">
                 <a:effectLst/>
                 <a:latin typeface="HSE Sans" panose="02000000000000000000"/>
                 <a:ea typeface="Calibri" panose="020F0502020204030204" pitchFamily="34" charset="0"/>
@@ -15500,7 +15514,7 @@
               <a:t>Электронный ресурс</a:t>
             </a:r>
             <a:r>
-              <a:rPr lang="en-US" sz="1800" dirty="0">
+              <a:rPr lang="en-US" sz="1600" dirty="0">
                 <a:effectLst/>
                 <a:latin typeface="HSE Sans" panose="02000000000000000000"/>
                 <a:ea typeface="Calibri" panose="020F0502020204030204" pitchFamily="34" charset="0"/>
@@ -15508,7 +15522,7 @@
               <a:t>]</a:t>
             </a:r>
             <a:r>
-              <a:rPr lang="ru-RU" sz="1800" dirty="0">
+              <a:rPr lang="ru-RU" sz="1600" dirty="0">
                 <a:effectLst/>
                 <a:latin typeface="HSE Sans" panose="02000000000000000000"/>
                 <a:ea typeface="Calibri" panose="020F0502020204030204" pitchFamily="34" charset="0"/>
@@ -15516,7 +15530,7 @@
               <a:t>. </a:t>
             </a:r>
             <a:r>
-              <a:rPr lang="en-US" sz="1800" dirty="0">
+              <a:rPr lang="en-US" sz="1600" dirty="0">
                 <a:effectLst/>
                 <a:latin typeface="HSE Sans" panose="02000000000000000000"/>
                 <a:ea typeface="Calibri" panose="020F0502020204030204" pitchFamily="34" charset="0"/>
@@ -15524,7 +15538,7 @@
               <a:t>URL: </a:t>
             </a:r>
             <a:r>
-              <a:rPr lang="en-US" sz="1800" dirty="0">
+              <a:rPr lang="en-US" sz="1600" dirty="0">
                 <a:effectLst/>
                 <a:latin typeface="HSE Sans" panose="02000000000000000000"/>
                 <a:ea typeface="Calibri" panose="020F0502020204030204" pitchFamily="34" charset="0"/>
@@ -15533,33 +15547,33 @@
               <a:t>https://www.postgresql.org/docs</a:t>
             </a:r>
             <a:r>
-              <a:rPr lang="en-US" sz="1800" dirty="0">
+              <a:rPr lang="en-US" sz="1600" dirty="0">
                 <a:effectLst/>
                 <a:latin typeface="HSE Sans" panose="02000000000000000000"/>
                 <a:ea typeface="Calibri" panose="020F0502020204030204" pitchFamily="34" charset="0"/>
               </a:rPr>
               <a:t>;</a:t>
             </a:r>
-            <a:endParaRPr lang="en-US" sz="1800" dirty="0"/>
+            <a:endParaRPr lang="en-US" sz="1600" dirty="0"/>
           </a:p>
           <a:p>
             <a:pPr marL="342900" indent="-342900" algn="just">
               <a:buAutoNum type="arabicPeriod"/>
             </a:pPr>
             <a:r>
-              <a:rPr lang="en-US" sz="1800" dirty="0"/>
+              <a:rPr lang="en-US" sz="1600" dirty="0"/>
               <a:t>React</a:t>
             </a:r>
             <a:r>
-              <a:rPr lang="ru-RU" sz="1800" dirty="0"/>
+              <a:rPr lang="ru-RU" sz="1600" dirty="0"/>
               <a:t> документация</a:t>
             </a:r>
             <a:r>
-              <a:rPr lang="en-US" sz="1800" dirty="0"/>
+              <a:rPr lang="en-US" sz="1600" dirty="0"/>
               <a:t> </a:t>
             </a:r>
             <a:r>
-              <a:rPr lang="en-US" sz="1800" dirty="0">
+              <a:rPr lang="en-US" sz="1600" dirty="0">
                 <a:effectLst/>
                 <a:latin typeface="HSE Sans" panose="02000000000000000000"/>
                 <a:ea typeface="Calibri" panose="020F0502020204030204" pitchFamily="34" charset="0"/>
@@ -15567,7 +15581,7 @@
               <a:t>[</a:t>
             </a:r>
             <a:r>
-              <a:rPr lang="ru-RU" sz="1800" dirty="0">
+              <a:rPr lang="ru-RU" sz="1600" dirty="0">
                 <a:effectLst/>
                 <a:latin typeface="HSE Sans" panose="02000000000000000000"/>
                 <a:ea typeface="Calibri" panose="020F0502020204030204" pitchFamily="34" charset="0"/>
@@ -15575,7 +15589,7 @@
               <a:t>Электронный ресурс</a:t>
             </a:r>
             <a:r>
-              <a:rPr lang="en-US" sz="1800" dirty="0">
+              <a:rPr lang="en-US" sz="1600" dirty="0">
                 <a:effectLst/>
                 <a:latin typeface="HSE Sans" panose="02000000000000000000"/>
                 <a:ea typeface="Calibri" panose="020F0502020204030204" pitchFamily="34" charset="0"/>
@@ -15583,7 +15597,7 @@
               <a:t>]</a:t>
             </a:r>
             <a:r>
-              <a:rPr lang="ru-RU" sz="1800" dirty="0">
+              <a:rPr lang="ru-RU" sz="1600" dirty="0">
                 <a:effectLst/>
                 <a:latin typeface="HSE Sans" panose="02000000000000000000"/>
                 <a:ea typeface="Calibri" panose="020F0502020204030204" pitchFamily="34" charset="0"/>
@@ -15591,7 +15605,7 @@
               <a:t>. </a:t>
             </a:r>
             <a:r>
-              <a:rPr lang="en-US" sz="1800" dirty="0">
+              <a:rPr lang="en-US" sz="1600" dirty="0">
                 <a:effectLst/>
                 <a:latin typeface="HSE Sans" panose="02000000000000000000"/>
                 <a:ea typeface="Calibri" panose="020F0502020204030204" pitchFamily="34" charset="0"/>
@@ -15599,7 +15613,7 @@
               <a:t>URL: </a:t>
             </a:r>
             <a:r>
-              <a:rPr lang="en-US" sz="1800" dirty="0">
+              <a:rPr lang="en-US" sz="1600" dirty="0">
                 <a:effectLst/>
                 <a:latin typeface="HSE Sans" panose="02000000000000000000"/>
                 <a:ea typeface="Calibri" panose="020F0502020204030204" pitchFamily="34" charset="0"/>
@@ -15608,32 +15622,32 @@
               <a:t>https://react.dev</a:t>
             </a:r>
             <a:r>
-              <a:rPr lang="en-US" sz="1800" dirty="0">
+              <a:rPr lang="en-US" sz="1600" dirty="0">
                 <a:latin typeface="HSE Sans" panose="02000000000000000000"/>
                 <a:ea typeface="Calibri" panose="020F0502020204030204" pitchFamily="34" charset="0"/>
               </a:rPr>
               <a:t>;</a:t>
             </a:r>
-            <a:endParaRPr lang="en-US" sz="1800" dirty="0"/>
+            <a:endParaRPr lang="en-US" sz="1600" dirty="0"/>
           </a:p>
           <a:p>
             <a:pPr marL="342900" indent="-342900" algn="just">
               <a:buAutoNum type="arabicPeriod"/>
             </a:pPr>
             <a:r>
-              <a:rPr lang="en-US" sz="1800" dirty="0"/>
+              <a:rPr lang="en-US" sz="1600" dirty="0"/>
               <a:t>Bootstrap</a:t>
             </a:r>
             <a:r>
-              <a:rPr lang="ru-RU" sz="1800" dirty="0"/>
+              <a:rPr lang="ru-RU" sz="1600" dirty="0"/>
               <a:t> документация</a:t>
             </a:r>
             <a:r>
-              <a:rPr lang="en-US" sz="1800" dirty="0"/>
+              <a:rPr lang="en-US" sz="1600" dirty="0"/>
               <a:t> </a:t>
             </a:r>
             <a:r>
-              <a:rPr lang="en-US" sz="1800" dirty="0">
+              <a:rPr lang="en-US" sz="1600" dirty="0">
                 <a:effectLst/>
                 <a:latin typeface="HSE Sans" panose="02000000000000000000"/>
                 <a:ea typeface="Calibri" panose="020F0502020204030204" pitchFamily="34" charset="0"/>
@@ -15641,7 +15655,7 @@
               <a:t>[</a:t>
             </a:r>
             <a:r>
-              <a:rPr lang="ru-RU" sz="1800" dirty="0">
+              <a:rPr lang="ru-RU" sz="1600" dirty="0">
                 <a:effectLst/>
                 <a:latin typeface="HSE Sans" panose="02000000000000000000"/>
                 <a:ea typeface="Calibri" panose="020F0502020204030204" pitchFamily="34" charset="0"/>
@@ -15649,7 +15663,7 @@
               <a:t>Электронный ресурс</a:t>
             </a:r>
             <a:r>
-              <a:rPr lang="en-US" sz="1800" dirty="0">
+              <a:rPr lang="en-US" sz="1600" dirty="0">
                 <a:effectLst/>
                 <a:latin typeface="HSE Sans" panose="02000000000000000000"/>
                 <a:ea typeface="Calibri" panose="020F0502020204030204" pitchFamily="34" charset="0"/>
@@ -15657,7 +15671,7 @@
               <a:t>]</a:t>
             </a:r>
             <a:r>
-              <a:rPr lang="ru-RU" sz="1800" dirty="0">
+              <a:rPr lang="ru-RU" sz="1600" dirty="0">
                 <a:effectLst/>
                 <a:latin typeface="HSE Sans" panose="02000000000000000000"/>
                 <a:ea typeface="Calibri" panose="020F0502020204030204" pitchFamily="34" charset="0"/>
@@ -15665,7 +15679,7 @@
               <a:t>. </a:t>
             </a:r>
             <a:r>
-              <a:rPr lang="en-US" sz="1800" dirty="0">
+              <a:rPr lang="en-US" sz="1600" dirty="0">
                 <a:effectLst/>
                 <a:latin typeface="HSE Sans" panose="02000000000000000000"/>
                 <a:ea typeface="Calibri" panose="020F0502020204030204" pitchFamily="34" charset="0"/>
@@ -15673,7 +15687,7 @@
               <a:t>URL: </a:t>
             </a:r>
             <a:r>
-              <a:rPr lang="en-US" sz="1800" dirty="0">
+              <a:rPr lang="en-US" sz="1600" dirty="0">
                 <a:effectLst/>
                 <a:latin typeface="HSE Sans" panose="02000000000000000000"/>
                 <a:ea typeface="Calibri" panose="020F0502020204030204" pitchFamily="34" charset="0"/>
@@ -15682,41 +15696,41 @@
               <a:t>https://getbootstrap.com/docs</a:t>
             </a:r>
             <a:r>
-              <a:rPr lang="en-US" sz="1800" dirty="0">
+              <a:rPr lang="en-US" sz="1600" dirty="0">
                 <a:effectLst/>
                 <a:latin typeface="HSE Sans" panose="02000000000000000000"/>
                 <a:ea typeface="Calibri" panose="020F0502020204030204" pitchFamily="34" charset="0"/>
               </a:rPr>
               <a:t>;</a:t>
             </a:r>
-            <a:endParaRPr lang="en-US" sz="1800" dirty="0"/>
+            <a:endParaRPr lang="en-US" sz="1600" dirty="0"/>
           </a:p>
           <a:p>
             <a:pPr marL="342900" indent="-342900" algn="just">
               <a:buAutoNum type="arabicPeriod"/>
             </a:pPr>
             <a:r>
-              <a:rPr lang="en-US" sz="1800" dirty="0"/>
+              <a:rPr lang="en-US" sz="1600" dirty="0"/>
               <a:t>React</a:t>
             </a:r>
             <a:r>
-              <a:rPr lang="ru-RU" sz="1800" dirty="0"/>
+              <a:rPr lang="ru-RU" sz="1600" dirty="0"/>
               <a:t> </a:t>
             </a:r>
             <a:r>
-              <a:rPr lang="en-US" sz="1800" dirty="0"/>
+              <a:rPr lang="en-US" sz="1600" dirty="0"/>
               <a:t>Bootstrap </a:t>
             </a:r>
             <a:r>
-              <a:rPr lang="ru-RU" sz="1800" dirty="0"/>
+              <a:rPr lang="ru-RU" sz="1600" dirty="0"/>
               <a:t>документация</a:t>
             </a:r>
             <a:r>
-              <a:rPr lang="en-US" sz="1800" dirty="0"/>
+              <a:rPr lang="en-US" sz="1600" dirty="0"/>
               <a:t> </a:t>
             </a:r>
             <a:r>
-              <a:rPr lang="en-US" sz="1800" dirty="0">
+              <a:rPr lang="en-US" sz="1600" dirty="0">
                 <a:effectLst/>
                 <a:latin typeface="HSE Sans" panose="02000000000000000000"/>
                 <a:ea typeface="Calibri" panose="020F0502020204030204" pitchFamily="34" charset="0"/>
@@ -15724,7 +15738,7 @@
               <a:t>[</a:t>
             </a:r>
             <a:r>
-              <a:rPr lang="ru-RU" sz="1800" dirty="0">
+              <a:rPr lang="ru-RU" sz="1600" dirty="0">
                 <a:effectLst/>
                 <a:latin typeface="HSE Sans" panose="02000000000000000000"/>
                 <a:ea typeface="Calibri" panose="020F0502020204030204" pitchFamily="34" charset="0"/>
@@ -15732,7 +15746,7 @@
               <a:t>Электронный ресурс</a:t>
             </a:r>
             <a:r>
-              <a:rPr lang="en-US" sz="1800" dirty="0">
+              <a:rPr lang="en-US" sz="1600" dirty="0">
                 <a:effectLst/>
                 <a:latin typeface="HSE Sans" panose="02000000000000000000"/>
                 <a:ea typeface="Calibri" panose="020F0502020204030204" pitchFamily="34" charset="0"/>
@@ -15740,7 +15754,7 @@
               <a:t>]</a:t>
             </a:r>
             <a:r>
-              <a:rPr lang="ru-RU" sz="1800" dirty="0">
+              <a:rPr lang="ru-RU" sz="1600" dirty="0">
                 <a:effectLst/>
                 <a:latin typeface="HSE Sans" panose="02000000000000000000"/>
                 <a:ea typeface="Calibri" panose="020F0502020204030204" pitchFamily="34" charset="0"/>
@@ -15748,7 +15762,7 @@
               <a:t>. </a:t>
             </a:r>
             <a:r>
-              <a:rPr lang="en-US" sz="1800" dirty="0">
+              <a:rPr lang="en-US" sz="1600" dirty="0">
                 <a:effectLst/>
                 <a:latin typeface="HSE Sans" panose="02000000000000000000"/>
                 <a:ea typeface="Calibri" panose="020F0502020204030204" pitchFamily="34" charset="0"/>
@@ -15756,7 +15770,7 @@
               <a:t>URL: </a:t>
             </a:r>
             <a:r>
-              <a:rPr lang="en-US" sz="1800" dirty="0">
+              <a:rPr lang="en-US" sz="1600" dirty="0">
                 <a:effectLst/>
                 <a:latin typeface="HSE Sans" panose="02000000000000000000"/>
                 <a:ea typeface="Calibri" panose="020F0502020204030204" pitchFamily="34" charset="0"/>
@@ -15765,14 +15779,163 @@
               <a:t>https://react-bootstrap.github.io</a:t>
             </a:r>
             <a:r>
-              <a:rPr lang="en-US" sz="1800" dirty="0">
+              <a:rPr lang="en-US" sz="1600" dirty="0">
                 <a:effectLst/>
                 <a:latin typeface="HSE Sans" panose="02000000000000000000"/>
                 <a:ea typeface="Calibri" panose="020F0502020204030204" pitchFamily="34" charset="0"/>
               </a:rPr>
               <a:t>;</a:t>
             </a:r>
-            <a:endParaRPr lang="ru-RU" sz="1800" dirty="0"/>
+          </a:p>
+          <a:p>
+            <a:pPr marL="342900" indent="-342900" algn="just">
+              <a:buAutoNum type="arabicPeriod"/>
+            </a:pPr>
+            <a:r>
+              <a:rPr lang="en-US" sz="1600" dirty="0">
+                <a:latin typeface="HSE Sans" panose="02000000000000000000"/>
+              </a:rPr>
+              <a:t>Google Classroom </a:t>
+            </a:r>
+            <a:r>
+              <a:rPr lang="en-US" sz="1600" dirty="0">
+                <a:effectLst/>
+                <a:latin typeface="HSE Sans" panose="02000000000000000000"/>
+                <a:ea typeface="Calibri" panose="020F0502020204030204" pitchFamily="34" charset="0"/>
+              </a:rPr>
+              <a:t>[</a:t>
+            </a:r>
+            <a:r>
+              <a:rPr lang="ru-RU" sz="1600" dirty="0">
+                <a:effectLst/>
+                <a:latin typeface="HSE Sans" panose="02000000000000000000"/>
+                <a:ea typeface="Calibri" panose="020F0502020204030204" pitchFamily="34" charset="0"/>
+              </a:rPr>
+              <a:t>Электронный ресурс</a:t>
+            </a:r>
+            <a:r>
+              <a:rPr lang="en-US" sz="1600" dirty="0">
+                <a:effectLst/>
+                <a:latin typeface="HSE Sans" panose="02000000000000000000"/>
+                <a:ea typeface="Calibri" panose="020F0502020204030204" pitchFamily="34" charset="0"/>
+              </a:rPr>
+              <a:t>]. URL: </a:t>
+            </a:r>
+            <a:r>
+              <a:rPr lang="en-US" sz="1600" dirty="0">
+                <a:effectLst/>
+                <a:latin typeface="HSE Sans" panose="02000000000000000000"/>
+                <a:ea typeface="Calibri" panose="020F0502020204030204" pitchFamily="34" charset="0"/>
+                <a:hlinkClick r:id="rId9"/>
+              </a:rPr>
+              <a:t>https://en.wikipedia.org/wiki/Google_Classroom</a:t>
+            </a:r>
+            <a:r>
+              <a:rPr lang="en-US" sz="1600" dirty="0">
+                <a:effectLst/>
+                <a:latin typeface="HSE Sans" panose="02000000000000000000"/>
+                <a:ea typeface="Calibri" panose="020F0502020204030204" pitchFamily="34" charset="0"/>
+              </a:rPr>
+              <a:t>;</a:t>
+            </a:r>
+          </a:p>
+          <a:p>
+            <a:pPr marL="342900" indent="-342900" algn="just">
+              <a:buAutoNum type="arabicPeriod"/>
+            </a:pPr>
+            <a:r>
+              <a:rPr lang="en-US" sz="1600" dirty="0">
+                <a:latin typeface="HSE Sans" panose="02000000000000000000"/>
+                <a:ea typeface="Calibri" panose="020F0502020204030204" pitchFamily="34" charset="0"/>
+              </a:rPr>
+              <a:t>Stepik [</a:t>
+            </a:r>
+            <a:r>
+              <a:rPr lang="ru-RU" sz="1600" dirty="0">
+                <a:latin typeface="HSE Sans" panose="02000000000000000000"/>
+                <a:ea typeface="Calibri" panose="020F0502020204030204" pitchFamily="34" charset="0"/>
+              </a:rPr>
+              <a:t>Электронный ресурс</a:t>
+            </a:r>
+            <a:r>
+              <a:rPr lang="en-US" sz="1600" dirty="0">
+                <a:latin typeface="HSE Sans" panose="02000000000000000000"/>
+                <a:ea typeface="Calibri" panose="020F0502020204030204" pitchFamily="34" charset="0"/>
+              </a:rPr>
+              <a:t>]. URL: </a:t>
+            </a:r>
+            <a:r>
+              <a:rPr lang="en-US" sz="1600" dirty="0">
+                <a:latin typeface="HSE Sans" panose="02000000000000000000"/>
+                <a:ea typeface="Calibri" panose="020F0502020204030204" pitchFamily="34" charset="0"/>
+                <a:hlinkClick r:id="rId10"/>
+              </a:rPr>
+              <a:t>https://stepik.org</a:t>
+            </a:r>
+            <a:r>
+              <a:rPr lang="en-US" sz="1600" dirty="0">
+                <a:latin typeface="HSE Sans" panose="02000000000000000000"/>
+                <a:ea typeface="Calibri" panose="020F0502020204030204" pitchFamily="34" charset="0"/>
+              </a:rPr>
+              <a:t>;</a:t>
+            </a:r>
+          </a:p>
+          <a:p>
+            <a:pPr marL="342900" indent="-342900" algn="just">
+              <a:buAutoNum type="arabicPeriod"/>
+            </a:pPr>
+            <a:r>
+              <a:rPr lang="en-US" sz="1600" dirty="0">
+                <a:latin typeface="HSE Sans" panose="02000000000000000000"/>
+                <a:ea typeface="Calibri" panose="020F0502020204030204" pitchFamily="34" charset="0"/>
+              </a:rPr>
+              <a:t>Photomath [</a:t>
+            </a:r>
+            <a:r>
+              <a:rPr lang="ru-RU" sz="1600" dirty="0">
+                <a:latin typeface="HSE Sans" panose="02000000000000000000"/>
+                <a:ea typeface="Calibri" panose="020F0502020204030204" pitchFamily="34" charset="0"/>
+              </a:rPr>
+              <a:t>Электронный ресурс</a:t>
+            </a:r>
+            <a:r>
+              <a:rPr lang="en-US" sz="1600" dirty="0">
+                <a:latin typeface="HSE Sans" panose="02000000000000000000"/>
+                <a:ea typeface="Calibri" panose="020F0502020204030204" pitchFamily="34" charset="0"/>
+              </a:rPr>
+              <a:t>]. URL: </a:t>
+            </a:r>
+            <a:r>
+              <a:rPr lang="en-US" sz="1600" dirty="0">
+                <a:latin typeface="HSE Sans" panose="02000000000000000000"/>
+                <a:ea typeface="Calibri" panose="020F0502020204030204" pitchFamily="34" charset="0"/>
+                <a:hlinkClick r:id="rId11"/>
+              </a:rPr>
+              <a:t>https://photomath.com</a:t>
+            </a:r>
+            <a:r>
+              <a:rPr lang="en-US" sz="1600" dirty="0">
+                <a:latin typeface="HSE Sans" panose="02000000000000000000"/>
+                <a:ea typeface="Calibri" panose="020F0502020204030204" pitchFamily="34" charset="0"/>
+              </a:rPr>
+              <a:t>.</a:t>
+            </a:r>
+          </a:p>
+          <a:p>
+            <a:pPr marL="342900" indent="-342900" algn="just">
+              <a:buAutoNum type="arabicPeriod"/>
+            </a:pPr>
+            <a:endParaRPr lang="en-US" sz="1600" dirty="0">
+              <a:effectLst/>
+              <a:latin typeface="HSE Sans" panose="02000000000000000000"/>
+              <a:ea typeface="Calibri" panose="020F0502020204030204" pitchFamily="34" charset="0"/>
+            </a:endParaRPr>
+          </a:p>
+          <a:p>
+            <a:pPr marL="342900" indent="-342900" algn="just">
+              <a:buAutoNum type="arabicPeriod"/>
+            </a:pPr>
+            <a:endParaRPr lang="ru-RU" sz="1600" dirty="0"/>
           </a:p>
         </p:txBody>
       </p:sp>
@@ -15891,8 +16054,8 @@
         </p:nvSpPr>
         <p:spPr>
           <a:xfrm>
-            <a:off x="585894" y="5444255"/>
-            <a:ext cx="5245560" cy="604908"/>
+            <a:off x="585890" y="5616498"/>
+            <a:ext cx="5245560" cy="422072"/>
           </a:xfrm>
           <a:prstGeom prst="rect">
             <a:avLst/>
@@ -15935,10 +16098,10 @@
       </p:sp>
       <p:sp>
         <p:nvSpPr>
-          <p:cNvPr id="8" name="Текст 3">
-            <a:extLst>
-              <a:ext uri="{FF2B5EF4-FFF2-40B4-BE49-F238E27FC236}">
-                <a16:creationId xmlns:a16="http://schemas.microsoft.com/office/drawing/2014/main" id="{8B734937-17AF-C675-952D-924D2B5ABE6A}"/>
+          <p:cNvPr id="9" name="Текст 3">
+            <a:extLst>
+              <a:ext uri="{FF2B5EF4-FFF2-40B4-BE49-F238E27FC236}">
+                <a16:creationId xmlns:a16="http://schemas.microsoft.com/office/drawing/2014/main" id="{21511F28-7B46-18DE-FF7A-6263E3909441}"/>
               </a:ext>
             </a:extLst>
           </p:cNvPr>
@@ -15949,8 +16112,8 @@
         </p:nvSpPr>
         <p:spPr>
           <a:xfrm>
-            <a:off x="468029" y="5613268"/>
-            <a:ext cx="9697725" cy="777026"/>
+            <a:off x="585890" y="6038570"/>
+            <a:ext cx="9697725" cy="422072"/>
           </a:xfrm>
           <a:prstGeom prst="rect">
             <a:avLst/>
@@ -16132,209 +16295,6 @@
           </a:lstStyle>
           <a:p>
             <a:pPr algn="just"/>
-            <a:endParaRPr lang="ru-RU" sz="1800" dirty="0"/>
-          </a:p>
-        </p:txBody>
-      </p:sp>
-      <p:sp>
-        <p:nvSpPr>
-          <p:cNvPr id="9" name="Текст 3">
-            <a:extLst>
-              <a:ext uri="{FF2B5EF4-FFF2-40B4-BE49-F238E27FC236}">
-                <a16:creationId xmlns:a16="http://schemas.microsoft.com/office/drawing/2014/main" id="{21511F28-7B46-18DE-FF7A-6263E3909441}"/>
-              </a:ext>
-            </a:extLst>
-          </p:cNvPr>
-          <p:cNvSpPr txBox="1">
-            <a:spLocks/>
-          </p:cNvSpPr>
-          <p:nvPr/>
-        </p:nvSpPr>
-        <p:spPr>
-          <a:xfrm>
-            <a:off x="585894" y="5866327"/>
-            <a:ext cx="9697725" cy="759074"/>
-          </a:xfrm>
-          <a:prstGeom prst="rect">
-            <a:avLst/>
-          </a:prstGeom>
-        </p:spPr>
-        <p:txBody>
-          <a:bodyPr vert="horz" lIns="0" tIns="0" rIns="0" bIns="45720" rtlCol="0">
-            <a:noAutofit/>
-          </a:bodyPr>
-          <a:lstStyle>
-            <a:lvl1pPr marL="0" marR="0" indent="0" algn="l" defTabSz="914400" rtl="0" eaLnBrk="1" fontAlgn="auto" latinLnBrk="0" hangingPunct="1">
-              <a:lnSpc>
-                <a:spcPct val="100000"/>
-              </a:lnSpc>
-              <a:spcBef>
-                <a:spcPts val="1000"/>
-              </a:spcBef>
-              <a:spcAft>
-                <a:spcPts val="0"/>
-              </a:spcAft>
-              <a:buClrTx/>
-              <a:buSzTx/>
-              <a:buFont typeface="Arial" panose="020B0604020202020204" pitchFamily="34" charset="0"/>
-              <a:buNone/>
-              <a:tabLst/>
-              <a:defRPr sz="1300" b="0" i="0" kern="1200">
-                <a:solidFill>
-                  <a:srgbClr val="0E2D69"/>
-                </a:solidFill>
-                <a:latin typeface="HSE Sans" panose="02000000000000000000" pitchFamily="2" charset="0"/>
-                <a:ea typeface="+mn-ea"/>
-                <a:cs typeface="+mn-cs"/>
-              </a:defRPr>
-            </a:lvl1pPr>
-            <a:lvl2pPr marL="457200" indent="0" algn="l" defTabSz="914400" rtl="0" eaLnBrk="1" latinLnBrk="0" hangingPunct="1">
-              <a:lnSpc>
-                <a:spcPct val="100000"/>
-              </a:lnSpc>
-              <a:spcBef>
-                <a:spcPts val="1000"/>
-              </a:spcBef>
-              <a:buFont typeface="Arial" panose="020B0604020202020204" pitchFamily="34" charset="0"/>
-              <a:buNone/>
-              <a:defRPr sz="1300" b="0" i="0" kern="1200">
-                <a:solidFill>
-                  <a:srgbClr val="0E2D69"/>
-                </a:solidFill>
-                <a:latin typeface="HSE Sans" panose="02000000000000000000" pitchFamily="2" charset="0"/>
-                <a:ea typeface="+mn-ea"/>
-                <a:cs typeface="+mn-cs"/>
-              </a:defRPr>
-            </a:lvl2pPr>
-            <a:lvl3pPr marL="914400" indent="0" algn="l" defTabSz="914400" rtl="0" eaLnBrk="1" latinLnBrk="0" hangingPunct="1">
-              <a:lnSpc>
-                <a:spcPct val="100000"/>
-              </a:lnSpc>
-              <a:spcBef>
-                <a:spcPts val="1000"/>
-              </a:spcBef>
-              <a:buFont typeface="Arial" panose="020B0604020202020204" pitchFamily="34" charset="0"/>
-              <a:buNone/>
-              <a:defRPr sz="1300" b="0" i="0" kern="1200">
-                <a:solidFill>
-                  <a:srgbClr val="0E2D69"/>
-                </a:solidFill>
-                <a:latin typeface="HSE Sans" panose="02000000000000000000" pitchFamily="2" charset="0"/>
-                <a:ea typeface="+mn-ea"/>
-                <a:cs typeface="+mn-cs"/>
-              </a:defRPr>
-            </a:lvl3pPr>
-            <a:lvl4pPr marL="1371600" indent="0" algn="l" defTabSz="914400" rtl="0" eaLnBrk="1" latinLnBrk="0" hangingPunct="1">
-              <a:lnSpc>
-                <a:spcPct val="100000"/>
-              </a:lnSpc>
-              <a:spcBef>
-                <a:spcPts val="1000"/>
-              </a:spcBef>
-              <a:buFont typeface="Arial" panose="020B0604020202020204" pitchFamily="34" charset="0"/>
-              <a:buNone/>
-              <a:defRPr sz="1300" b="0" i="0" kern="1200">
-                <a:solidFill>
-                  <a:srgbClr val="0E2D69"/>
-                </a:solidFill>
-                <a:latin typeface="HSE Sans" panose="02000000000000000000" pitchFamily="2" charset="0"/>
-                <a:ea typeface="+mn-ea"/>
-                <a:cs typeface="+mn-cs"/>
-              </a:defRPr>
-            </a:lvl4pPr>
-            <a:lvl5pPr marL="1828800" indent="0" algn="l" defTabSz="914400" rtl="0" eaLnBrk="1" latinLnBrk="0" hangingPunct="1">
-              <a:lnSpc>
-                <a:spcPct val="100000"/>
-              </a:lnSpc>
-              <a:spcBef>
-                <a:spcPts val="1000"/>
-              </a:spcBef>
-              <a:buFont typeface="Arial" panose="020B0604020202020204" pitchFamily="34" charset="0"/>
-              <a:buNone/>
-              <a:defRPr sz="1300" b="0" i="0" kern="1200">
-                <a:solidFill>
-                  <a:srgbClr val="0E2D69"/>
-                </a:solidFill>
-                <a:latin typeface="HSE Sans" panose="02000000000000000000" pitchFamily="2" charset="0"/>
-                <a:ea typeface="+mn-ea"/>
-                <a:cs typeface="+mn-cs"/>
-              </a:defRPr>
-            </a:lvl5pPr>
-            <a:lvl6pPr marL="2514600" indent="-228600" algn="l" defTabSz="914400" rtl="0" eaLnBrk="1" latinLnBrk="0" hangingPunct="1">
-              <a:lnSpc>
-                <a:spcPct val="90000"/>
-              </a:lnSpc>
-              <a:spcBef>
-                <a:spcPts val="500"/>
-              </a:spcBef>
-              <a:buFont typeface="Arial" panose="020B0604020202020204" pitchFamily="34" charset="0"/>
-              <a:buChar char="•"/>
-              <a:defRPr sz="1800" kern="1200">
-                <a:solidFill>
-                  <a:schemeClr val="tx1"/>
-                </a:solidFill>
-                <a:latin typeface="+mn-lt"/>
-                <a:ea typeface="+mn-ea"/>
-                <a:cs typeface="+mn-cs"/>
-              </a:defRPr>
-            </a:lvl6pPr>
-            <a:lvl7pPr marL="2971800" indent="-228600" algn="l" defTabSz="914400" rtl="0" eaLnBrk="1" latinLnBrk="0" hangingPunct="1">
-              <a:lnSpc>
-                <a:spcPct val="90000"/>
-              </a:lnSpc>
-              <a:spcBef>
-                <a:spcPts val="500"/>
-              </a:spcBef>
-              <a:buFont typeface="Arial" panose="020B0604020202020204" pitchFamily="34" charset="0"/>
-              <a:buChar char="•"/>
-              <a:defRPr sz="1800" kern="1200">
-                <a:solidFill>
-                  <a:schemeClr val="tx1"/>
-                </a:solidFill>
-                <a:latin typeface="+mn-lt"/>
-                <a:ea typeface="+mn-ea"/>
-                <a:cs typeface="+mn-cs"/>
-              </a:defRPr>
-            </a:lvl7pPr>
-            <a:lvl8pPr marL="3429000" indent="-228600" algn="l" defTabSz="914400" rtl="0" eaLnBrk="1" latinLnBrk="0" hangingPunct="1">
-              <a:lnSpc>
-                <a:spcPct val="90000"/>
-              </a:lnSpc>
-              <a:spcBef>
-                <a:spcPts val="500"/>
-              </a:spcBef>
-              <a:buFont typeface="Arial" panose="020B0604020202020204" pitchFamily="34" charset="0"/>
-              <a:buChar char="•"/>
-              <a:defRPr sz="1800" kern="1200">
-                <a:solidFill>
-                  <a:schemeClr val="tx1"/>
-                </a:solidFill>
-                <a:latin typeface="+mn-lt"/>
-                <a:ea typeface="+mn-ea"/>
-                <a:cs typeface="+mn-cs"/>
-              </a:defRPr>
-            </a:lvl8pPr>
-            <a:lvl9pPr marL="3886200" indent="-228600" algn="l" defTabSz="914400" rtl="0" eaLnBrk="1" latinLnBrk="0" hangingPunct="1">
-              <a:lnSpc>
-                <a:spcPct val="90000"/>
-              </a:lnSpc>
-              <a:spcBef>
-                <a:spcPts val="500"/>
-              </a:spcBef>
-              <a:buFont typeface="Arial" panose="020B0604020202020204" pitchFamily="34" charset="0"/>
-              <a:buChar char="•"/>
-              <a:defRPr sz="1800" kern="1200">
-                <a:solidFill>
-                  <a:schemeClr val="tx1"/>
-                </a:solidFill>
-                <a:latin typeface="+mn-lt"/>
-                <a:ea typeface="+mn-ea"/>
-                <a:cs typeface="+mn-cs"/>
-              </a:defRPr>
-            </a:lvl9pPr>
-          </a:lstStyle>
-          <a:p>
-            <a:pPr algn="just"/>
             <a:r>
               <a:rPr lang="en-US" sz="1800" dirty="0">
                 <a:effectLst/>
@@ -16377,7 +16337,7 @@
             </a:r>
             <a:r>
               <a:rPr lang="en-US" sz="1800" dirty="0">
-                <a:hlinkClick r:id="rId9"/>
+                <a:hlinkClick r:id="rId12"/>
               </a:rPr>
               <a:t>https://github.com/adadgoff/ManuScript</a:t>
             </a:r>
@@ -16939,7 +16899,7 @@
             <a:pPr algn="just"/>
             <a:r>
               <a:rPr lang="ru-RU" sz="1800" dirty="0"/>
-              <a:t>Основные клиенты сервиса: преподаватели и учащиеся образовательных учреждений.</a:t>
+              <a:t>Основные клиенты приложения: преподаватели и учащиеся образовательных учреждений.</a:t>
             </a:r>
           </a:p>
         </p:txBody>
@@ -17167,7 +17127,7 @@
         <p:spPr>
           <a:xfrm>
             <a:off x="585897" y="2379663"/>
-            <a:ext cx="5510103" cy="3393234"/>
+            <a:ext cx="5673995" cy="3393234"/>
           </a:xfrm>
         </p:spPr>
         <p:txBody>
@@ -17181,15 +17141,7 @@
             </a:pPr>
             <a:r>
               <a:rPr lang="ru-RU" sz="1800" dirty="0"/>
-              <a:t>Автоматизация процесса проверки работ учеников</a:t>
-            </a:r>
-            <a:r>
-              <a:rPr lang="en-US" sz="1800" dirty="0"/>
-              <a:t>/</a:t>
-            </a:r>
-            <a:r>
-              <a:rPr lang="ru-RU" sz="1800" dirty="0"/>
-              <a:t>студентов</a:t>
+              <a:t>Автоматизация процесса проверки рукописных работ учащихся</a:t>
             </a:r>
             <a:r>
               <a:rPr lang="en-US" sz="1800" dirty="0"/>
@@ -17203,7 +17155,7 @@
             </a:pPr>
             <a:r>
               <a:rPr lang="ru-RU" sz="1800" dirty="0"/>
-              <a:t>Постоянный доступ к работам учащихся.</a:t>
+              <a:t>Обеспечение постоянного доступа к их работам.</a:t>
             </a:r>
           </a:p>
           <a:p>
@@ -18103,7 +18055,7 @@
           <p:nvPr>
             <p:extLst>
               <p:ext uri="{D42A27DB-BD31-4B8C-83A1-F6EECF244321}">
-                <p14:modId xmlns:p14="http://schemas.microsoft.com/office/powerpoint/2010/main" val="1511195363"/>
+                <p14:modId xmlns:p14="http://schemas.microsoft.com/office/powerpoint/2010/main" val="1474423836"/>
               </p:ext>
             </p:extLst>
           </p:nvPr>
@@ -18356,6 +18308,95 @@
                     <a:p>
                       <a:r>
                         <a:rPr lang="ru-RU" sz="1800" dirty="0"/>
+                        <a:t>Доступ к рукописным работам учащихся</a:t>
+                      </a:r>
+                    </a:p>
+                  </a:txBody>
+                  <a:tcPr/>
+                </a:tc>
+                <a:tc>
+                  <a:txBody>
+                    <a:bodyPr/>
+                    <a:lstStyle/>
+                    <a:p>
+                      <a:r>
+                        <a:rPr lang="ru-RU" sz="1800" b="1" dirty="0"/>
+                        <a:t>+</a:t>
+                      </a:r>
+                    </a:p>
+                  </a:txBody>
+                  <a:tcPr/>
+                </a:tc>
+                <a:tc>
+                  <a:txBody>
+                    <a:bodyPr/>
+                    <a:lstStyle/>
+                    <a:p>
+                      <a:r>
+                        <a:rPr lang="ru-RU" sz="1800" b="1" dirty="0"/>
+                        <a:t>-</a:t>
+                      </a:r>
+                    </a:p>
+                  </a:txBody>
+                  <a:tcPr/>
+                </a:tc>
+                <a:tc>
+                  <a:txBody>
+                    <a:bodyPr/>
+                    <a:lstStyle/>
+                    <a:p>
+                      <a:pPr marL="0" marR="0" lvl="0" indent="0" algn="l" defTabSz="914400" rtl="0" eaLnBrk="1" fontAlgn="auto" latinLnBrk="0" hangingPunct="1">
+                        <a:lnSpc>
+                          <a:spcPct val="100000"/>
+                        </a:lnSpc>
+                        <a:spcBef>
+                          <a:spcPts val="0"/>
+                        </a:spcBef>
+                        <a:spcAft>
+                          <a:spcPts val="0"/>
+                        </a:spcAft>
+                        <a:buClrTx/>
+                        <a:buSzTx/>
+                        <a:buFontTx/>
+                        <a:buNone/>
+                        <a:tabLst/>
+                        <a:defRPr/>
+                      </a:pPr>
+                      <a:r>
+                        <a:rPr lang="ru-RU" sz="1800" b="1" dirty="0"/>
+                        <a:t>-</a:t>
+                      </a:r>
+                    </a:p>
+                  </a:txBody>
+                  <a:tcPr/>
+                </a:tc>
+                <a:tc>
+                  <a:txBody>
+                    <a:bodyPr/>
+                    <a:lstStyle/>
+                    <a:p>
+                      <a:r>
+                        <a:rPr lang="ru-RU" sz="1800" b="1" dirty="0"/>
+                        <a:t>+</a:t>
+                      </a:r>
+                    </a:p>
+                  </a:txBody>
+                  <a:tcPr/>
+                </a:tc>
+                <a:extLst>
+                  <a:ext uri="{0D108BD9-81ED-4DB2-BD59-A6C34878D82A}">
+                    <a16:rowId xmlns:a16="http://schemas.microsoft.com/office/drawing/2014/main" val="4164999476"/>
+                  </a:ext>
+                </a:extLst>
+              </a:tr>
+              <a:tr h="477037">
+                <a:tc>
+                  <a:txBody>
+                    <a:bodyPr/>
+                    <a:lstStyle/>
+                    <a:p>
+                      <a:r>
+                        <a:rPr lang="ru-RU" sz="1800" dirty="0"/>
                         <a:t>Автоматическая проверка через стандартизированные тесты</a:t>
                       </a:r>
                     </a:p>
@@ -18416,7 +18457,7 @@
                       </a:pPr>
                       <a:r>
                         <a:rPr lang="ru-RU" sz="1800" b="1" dirty="0"/>
-                        <a:t>+</a:t>
+                        <a:t>-</a:t>
                       </a:r>
                     </a:p>
                   </a:txBody>
@@ -18542,7 +18583,7 @@
                     <a:p>
                       <a:r>
                         <a:rPr lang="ru-RU" sz="1800" b="1" dirty="0"/>
-                        <a:t>+</a:t>
+                        <a:t>-</a:t>
                       </a:r>
                     </a:p>
                   </a:txBody>
@@ -18597,156 +18638,6 @@
                 <a:extLst>
                   <a:ext uri="{0D108BD9-81ED-4DB2-BD59-A6C34878D82A}">
                     <a16:rowId xmlns:a16="http://schemas.microsoft.com/office/drawing/2014/main" val="711161702"/>
-                  </a:ext>
-                </a:extLst>
-              </a:tr>
-              <a:tr h="477037">
-                <a:tc>
-                  <a:txBody>
-                    <a:bodyPr/>
-                    <a:lstStyle/>
-                    <a:p>
-                      <a:r>
-                        <a:rPr lang="ru-RU" sz="1800" dirty="0"/>
-                        <a:t>Сканирование текста с фотографии</a:t>
-                      </a:r>
-                    </a:p>
-                  </a:txBody>
-                  <a:tcPr>
-                    <a:solidFill>
-                      <a:schemeClr val="accent2">
-                        <a:lumMod val="60000"/>
-                        <a:lumOff val="40000"/>
-                      </a:schemeClr>
-                    </a:solidFill>
-                  </a:tcPr>
-                </a:tc>
-                <a:tc>
-                  <a:txBody>
-                    <a:bodyPr/>
-                    <a:lstStyle/>
-                    <a:p>
-                      <a:pPr marL="0" marR="0" lvl="0" indent="0" algn="l" defTabSz="914400" rtl="0" eaLnBrk="1" fontAlgn="auto" latinLnBrk="0" hangingPunct="1">
-                        <a:lnSpc>
-                          <a:spcPct val="100000"/>
-                        </a:lnSpc>
-                        <a:spcBef>
-                          <a:spcPts val="0"/>
-                        </a:spcBef>
-                        <a:spcAft>
-                          <a:spcPts val="0"/>
-                        </a:spcAft>
-                        <a:buClrTx/>
-                        <a:buSzTx/>
-                        <a:buFontTx/>
-                        <a:buNone/>
-                        <a:tabLst/>
-                        <a:defRPr/>
-                      </a:pPr>
-                      <a:r>
-                        <a:rPr lang="ru-RU" sz="1800" b="1" dirty="0"/>
-                        <a:t>-</a:t>
-                      </a:r>
-                    </a:p>
-                  </a:txBody>
-                  <a:tcPr>
-                    <a:solidFill>
-                      <a:schemeClr val="accent2">
-                        <a:lumMod val="60000"/>
-                        <a:lumOff val="40000"/>
-                      </a:schemeClr>
-                    </a:solidFill>
-                  </a:tcPr>
-                </a:tc>
-                <a:tc>
-                  <a:txBody>
-                    <a:bodyPr/>
-                    <a:lstStyle/>
-                    <a:p>
-                      <a:r>
-                        <a:rPr lang="ru-RU" sz="1800" b="1" dirty="0"/>
-                        <a:t>+</a:t>
-                      </a:r>
-                    </a:p>
-                  </a:txBody>
-                  <a:tcPr>
-                    <a:solidFill>
-                      <a:schemeClr val="accent2">
-                        <a:lumMod val="60000"/>
-                        <a:lumOff val="40000"/>
-                      </a:schemeClr>
-                    </a:solidFill>
-                  </a:tcPr>
-                </a:tc>
-                <a:tc>
-                  <a:txBody>
-                    <a:bodyPr/>
-                    <a:lstStyle/>
-                    <a:p>
-                      <a:r>
-                        <a:rPr lang="ru-RU" sz="1800" b="1" dirty="0"/>
-                        <a:t>-</a:t>
-                      </a:r>
-                    </a:p>
-                  </a:txBody>
-                  <a:tcPr>
-                    <a:solidFill>
-                      <a:schemeClr val="accent2">
-                        <a:lumMod val="60000"/>
-                        <a:lumOff val="40000"/>
-                      </a:schemeClr>
-                    </a:solidFill>
-                  </a:tcPr>
-                </a:tc>
-                <a:tc>
-                  <a:txBody>
-                    <a:bodyPr/>
-                    <a:lstStyle/>
-                    <a:p>
-                      <a:pPr marL="0" marR="0" lvl="0" indent="0" algn="l" defTabSz="914400" rtl="0" eaLnBrk="1" fontAlgn="auto" latinLnBrk="0" hangingPunct="1">
-                        <a:lnSpc>
-                          <a:spcPct val="100000"/>
-                        </a:lnSpc>
-                        <a:spcBef>
-                          <a:spcPts val="0"/>
-                        </a:spcBef>
-                        <a:spcAft>
-                          <a:spcPts val="0"/>
-                        </a:spcAft>
-                        <a:buClrTx/>
-                        <a:buSzTx/>
-                        <a:buFontTx/>
-                        <a:buNone/>
-                        <a:tabLst/>
-                        <a:defRPr/>
-                      </a:pPr>
-                      <a:r>
-                        <a:rPr lang="en-US" sz="1800" b="1" dirty="0"/>
-                        <a:t>[</a:t>
-                      </a:r>
-                      <a:r>
-                        <a:rPr lang="ru-RU" sz="1800" b="1" dirty="0"/>
-                        <a:t>+</a:t>
-                      </a:r>
-                      <a:r>
-                        <a:rPr lang="en-US" sz="1800" b="1" dirty="0"/>
-                        <a:t>]</a:t>
-                      </a:r>
-                      <a:endParaRPr lang="ru-RU" sz="1800" b="1" dirty="0"/>
-                    </a:p>
-                  </a:txBody>
-                  <a:tcPr>
-                    <a:solidFill>
-                      <a:schemeClr val="accent2">
-                        <a:lumMod val="60000"/>
-                        <a:lumOff val="40000"/>
-                      </a:schemeClr>
-                    </a:solidFill>
-                  </a:tcPr>
-                </a:tc>
-                <a:extLst>
-                  <a:ext uri="{0D108BD9-81ED-4DB2-BD59-A6C34878D82A}">
-                    <a16:rowId xmlns:a16="http://schemas.microsoft.com/office/drawing/2014/main" val="3218863689"/>
                   </a:ext>
                 </a:extLst>
               </a:tr>
@@ -20126,7 +20017,7 @@
             </a:r>
             <a:r>
               <a:rPr lang="en-US" sz="1800" dirty="0"/>
-              <a:t>: DTO (Data Transfer Object);</a:t>
+              <a:t>: DTO (Data Transfer Object).</a:t>
             </a:r>
             <a:endParaRPr lang="ru-RU" sz="1800" dirty="0"/>
           </a:p>

</xml_diff>